<commit_message>
Ajustes en ppt y word
</commit_message>
<xml_diff>
--- a/GestionProy - Presentacion.pptx
+++ b/GestionProy - Presentacion.pptx
@@ -24,7 +24,12 @@
     <p:sldId id="272" r:id="rId18"/>
     <p:sldId id="273" r:id="rId19"/>
     <p:sldId id="274" r:id="rId20"/>
-    <p:sldId id="275" r:id="rId21"/>
+    <p:sldId id="276" r:id="rId21"/>
+    <p:sldId id="277" r:id="rId22"/>
+    <p:sldId id="278" r:id="rId23"/>
+    <p:sldId id="280" r:id="rId24"/>
+    <p:sldId id="279" r:id="rId25"/>
+    <p:sldId id="275" r:id="rId26"/>
   </p:sldIdLst>
   <p:sldSz cx="12192000" cy="6858000"/>
   <p:notesSz cx="6858000" cy="9144000"/>
@@ -1814,6 +1819,757 @@
   <dgm:styleLbl name="revTx">
     <dgm:fillClrLst meth="repeat">
       <a:schemeClr val="lt1">
+        <a:alpha val="0"/>
+      </a:schemeClr>
+    </dgm:fillClrLst>
+    <dgm:linClrLst meth="repeat">
+      <a:schemeClr val="dk1">
+        <a:alpha val="0"/>
+      </a:schemeClr>
+    </dgm:linClrLst>
+    <dgm:effectClrLst/>
+    <dgm:txLinClrLst/>
+    <dgm:txFillClrLst meth="repeat">
+      <a:schemeClr val="tx1"/>
+    </dgm:txFillClrLst>
+    <dgm:txEffectClrLst/>
+  </dgm:styleLbl>
+</dgm:colorsDef>
+</file>
+
+<file path=ppt/diagrams/colors3.xml><?xml version="1.0" encoding="utf-8"?>
+<dgm:colorsDef xmlns:dgm="http://schemas.openxmlformats.org/drawingml/2006/diagram" xmlns:a="http://schemas.openxmlformats.org/drawingml/2006/main" uniqueId="urn:microsoft.com/office/officeart/2005/8/colors/accent0_3">
+  <dgm:title val=""/>
+  <dgm:desc val=""/>
+  <dgm:catLst>
+    <dgm:cat type="mainScheme" pri="10300"/>
+  </dgm:catLst>
+  <dgm:styleLbl name="node0">
+    <dgm:fillClrLst meth="repeat">
+      <a:schemeClr val="dk2"/>
+    </dgm:fillClrLst>
+    <dgm:linClrLst meth="repeat">
+      <a:schemeClr val="lt2"/>
+    </dgm:linClrLst>
+    <dgm:effectClrLst/>
+    <dgm:txLinClrLst/>
+    <dgm:txFillClrLst/>
+    <dgm:txEffectClrLst/>
+  </dgm:styleLbl>
+  <dgm:styleLbl name="alignNode1">
+    <dgm:fillClrLst meth="repeat">
+      <a:schemeClr val="dk2"/>
+    </dgm:fillClrLst>
+    <dgm:linClrLst meth="repeat">
+      <a:schemeClr val="dk2"/>
+    </dgm:linClrLst>
+    <dgm:effectClrLst/>
+    <dgm:txLinClrLst/>
+    <dgm:txFillClrLst/>
+    <dgm:txEffectClrLst/>
+  </dgm:styleLbl>
+  <dgm:styleLbl name="node1">
+    <dgm:fillClrLst meth="repeat">
+      <a:schemeClr val="dk2"/>
+    </dgm:fillClrLst>
+    <dgm:linClrLst meth="repeat">
+      <a:schemeClr val="lt2"/>
+    </dgm:linClrLst>
+    <dgm:effectClrLst/>
+    <dgm:txLinClrLst/>
+    <dgm:txFillClrLst/>
+    <dgm:txEffectClrLst/>
+  </dgm:styleLbl>
+  <dgm:styleLbl name="lnNode1">
+    <dgm:fillClrLst meth="repeat">
+      <a:schemeClr val="dk2"/>
+    </dgm:fillClrLst>
+    <dgm:linClrLst meth="repeat">
+      <a:schemeClr val="lt2"/>
+    </dgm:linClrLst>
+    <dgm:effectClrLst/>
+    <dgm:txLinClrLst/>
+    <dgm:txFillClrLst/>
+    <dgm:txEffectClrLst/>
+  </dgm:styleLbl>
+  <dgm:styleLbl name="vennNode1">
+    <dgm:fillClrLst meth="repeat">
+      <a:schemeClr val="dk2">
+        <a:alpha val="50000"/>
+      </a:schemeClr>
+    </dgm:fillClrLst>
+    <dgm:linClrLst meth="repeat">
+      <a:schemeClr val="lt2"/>
+    </dgm:linClrLst>
+    <dgm:effectClrLst/>
+    <dgm:txLinClrLst/>
+    <dgm:txFillClrLst/>
+    <dgm:txEffectClrLst/>
+  </dgm:styleLbl>
+  <dgm:styleLbl name="node2">
+    <dgm:fillClrLst meth="repeat">
+      <a:schemeClr val="dk2"/>
+    </dgm:fillClrLst>
+    <dgm:linClrLst meth="repeat">
+      <a:schemeClr val="lt2"/>
+    </dgm:linClrLst>
+    <dgm:effectClrLst/>
+    <dgm:txLinClrLst/>
+    <dgm:txFillClrLst/>
+    <dgm:txEffectClrLst/>
+  </dgm:styleLbl>
+  <dgm:styleLbl name="node3">
+    <dgm:fillClrLst meth="repeat">
+      <a:schemeClr val="dk2"/>
+    </dgm:fillClrLst>
+    <dgm:linClrLst meth="repeat">
+      <a:schemeClr val="lt2"/>
+    </dgm:linClrLst>
+    <dgm:effectClrLst/>
+    <dgm:txLinClrLst/>
+    <dgm:txFillClrLst/>
+    <dgm:txEffectClrLst/>
+  </dgm:styleLbl>
+  <dgm:styleLbl name="node4">
+    <dgm:fillClrLst meth="repeat">
+      <a:schemeClr val="dk2"/>
+    </dgm:fillClrLst>
+    <dgm:linClrLst meth="repeat">
+      <a:schemeClr val="lt2"/>
+    </dgm:linClrLst>
+    <dgm:effectClrLst/>
+    <dgm:txLinClrLst/>
+    <dgm:txFillClrLst/>
+    <dgm:txEffectClrLst/>
+  </dgm:styleLbl>
+  <dgm:styleLbl name="fgImgPlace1">
+    <dgm:fillClrLst meth="repeat">
+      <a:schemeClr val="dk2">
+        <a:tint val="50000"/>
+      </a:schemeClr>
+    </dgm:fillClrLst>
+    <dgm:linClrLst meth="repeat">
+      <a:schemeClr val="lt2"/>
+    </dgm:linClrLst>
+    <dgm:effectClrLst/>
+    <dgm:txLinClrLst/>
+    <dgm:txFillClrLst meth="repeat">
+      <a:schemeClr val="lt2"/>
+    </dgm:txFillClrLst>
+    <dgm:txEffectClrLst/>
+  </dgm:styleLbl>
+  <dgm:styleLbl name="alignImgPlace1">
+    <dgm:fillClrLst meth="repeat">
+      <a:schemeClr val="dk2">
+        <a:tint val="50000"/>
+      </a:schemeClr>
+    </dgm:fillClrLst>
+    <dgm:linClrLst meth="repeat">
+      <a:schemeClr val="dk2">
+        <a:shade val="80000"/>
+      </a:schemeClr>
+    </dgm:linClrLst>
+    <dgm:effectClrLst/>
+    <dgm:txLinClrLst/>
+    <dgm:txFillClrLst meth="repeat">
+      <a:schemeClr val="lt2"/>
+    </dgm:txFillClrLst>
+    <dgm:txEffectClrLst/>
+  </dgm:styleLbl>
+  <dgm:styleLbl name="bgImgPlace1">
+    <dgm:fillClrLst meth="repeat">
+      <a:schemeClr val="dk2">
+        <a:tint val="50000"/>
+      </a:schemeClr>
+    </dgm:fillClrLst>
+    <dgm:linClrLst meth="repeat">
+      <a:schemeClr val="dk2">
+        <a:shade val="80000"/>
+      </a:schemeClr>
+    </dgm:linClrLst>
+    <dgm:effectClrLst/>
+    <dgm:txLinClrLst/>
+    <dgm:txFillClrLst meth="repeat">
+      <a:schemeClr val="lt2"/>
+    </dgm:txFillClrLst>
+    <dgm:txEffectClrLst/>
+  </dgm:styleLbl>
+  <dgm:styleLbl name="sibTrans2D1">
+    <dgm:fillClrLst meth="repeat">
+      <a:schemeClr val="dk2">
+        <a:tint val="60000"/>
+      </a:schemeClr>
+    </dgm:fillClrLst>
+    <dgm:linClrLst meth="repeat">
+      <a:schemeClr val="dk2">
+        <a:tint val="60000"/>
+      </a:schemeClr>
+    </dgm:linClrLst>
+    <dgm:effectClrLst/>
+    <dgm:txLinClrLst/>
+    <dgm:txFillClrLst/>
+    <dgm:txEffectClrLst/>
+  </dgm:styleLbl>
+  <dgm:styleLbl name="fgSibTrans2D1">
+    <dgm:fillClrLst meth="repeat">
+      <a:schemeClr val="dk2">
+        <a:tint val="60000"/>
+      </a:schemeClr>
+    </dgm:fillClrLst>
+    <dgm:linClrLst meth="repeat">
+      <a:schemeClr val="dk2">
+        <a:tint val="60000"/>
+      </a:schemeClr>
+    </dgm:linClrLst>
+    <dgm:effectClrLst/>
+    <dgm:txLinClrLst/>
+    <dgm:txFillClrLst/>
+    <dgm:txEffectClrLst/>
+  </dgm:styleLbl>
+  <dgm:styleLbl name="bgSibTrans2D1">
+    <dgm:fillClrLst meth="repeat">
+      <a:schemeClr val="dk2">
+        <a:tint val="60000"/>
+      </a:schemeClr>
+    </dgm:fillClrLst>
+    <dgm:linClrLst meth="repeat">
+      <a:schemeClr val="dk2">
+        <a:tint val="60000"/>
+      </a:schemeClr>
+    </dgm:linClrLst>
+    <dgm:effectClrLst/>
+    <dgm:txLinClrLst/>
+    <dgm:txFillClrLst/>
+    <dgm:txEffectClrLst/>
+  </dgm:styleLbl>
+  <dgm:styleLbl name="sibTrans1D1">
+    <dgm:fillClrLst meth="repeat">
+      <a:schemeClr val="dk2"/>
+    </dgm:fillClrLst>
+    <dgm:linClrLst meth="repeat">
+      <a:schemeClr val="dk2"/>
+    </dgm:linClrLst>
+    <dgm:effectClrLst/>
+    <dgm:txLinClrLst/>
+    <dgm:txFillClrLst meth="repeat">
+      <a:schemeClr val="lt2"/>
+    </dgm:txFillClrLst>
+    <dgm:txEffectClrLst/>
+  </dgm:styleLbl>
+  <dgm:styleLbl name="callout">
+    <dgm:fillClrLst meth="repeat">
+      <a:schemeClr val="dk2"/>
+    </dgm:fillClrLst>
+    <dgm:linClrLst meth="repeat">
+      <a:schemeClr val="dk2">
+        <a:tint val="50000"/>
+      </a:schemeClr>
+    </dgm:linClrLst>
+    <dgm:effectClrLst/>
+    <dgm:txLinClrLst/>
+    <dgm:txFillClrLst meth="repeat">
+      <a:schemeClr val="lt2"/>
+    </dgm:txFillClrLst>
+    <dgm:txEffectClrLst/>
+  </dgm:styleLbl>
+  <dgm:styleLbl name="asst0">
+    <dgm:fillClrLst meth="repeat">
+      <a:schemeClr val="dk2"/>
+    </dgm:fillClrLst>
+    <dgm:linClrLst meth="repeat">
+      <a:schemeClr val="lt2"/>
+    </dgm:linClrLst>
+    <dgm:effectClrLst/>
+    <dgm:txLinClrLst/>
+    <dgm:txFillClrLst/>
+    <dgm:txEffectClrLst/>
+  </dgm:styleLbl>
+  <dgm:styleLbl name="asst1">
+    <dgm:fillClrLst meth="repeat">
+      <a:schemeClr val="dk2"/>
+    </dgm:fillClrLst>
+    <dgm:linClrLst meth="repeat">
+      <a:schemeClr val="lt2"/>
+    </dgm:linClrLst>
+    <dgm:effectClrLst/>
+    <dgm:txLinClrLst/>
+    <dgm:txFillClrLst/>
+    <dgm:txEffectClrLst/>
+  </dgm:styleLbl>
+  <dgm:styleLbl name="asst2">
+    <dgm:fillClrLst meth="repeat">
+      <a:schemeClr val="dk2"/>
+    </dgm:fillClrLst>
+    <dgm:linClrLst meth="repeat">
+      <a:schemeClr val="lt2"/>
+    </dgm:linClrLst>
+    <dgm:effectClrLst/>
+    <dgm:txLinClrLst/>
+    <dgm:txFillClrLst/>
+    <dgm:txEffectClrLst/>
+  </dgm:styleLbl>
+  <dgm:styleLbl name="asst3">
+    <dgm:fillClrLst meth="repeat">
+      <a:schemeClr val="dk2"/>
+    </dgm:fillClrLst>
+    <dgm:linClrLst meth="repeat">
+      <a:schemeClr val="lt2"/>
+    </dgm:linClrLst>
+    <dgm:effectClrLst/>
+    <dgm:txLinClrLst/>
+    <dgm:txFillClrLst/>
+    <dgm:txEffectClrLst/>
+  </dgm:styleLbl>
+  <dgm:styleLbl name="asst4">
+    <dgm:fillClrLst meth="repeat">
+      <a:schemeClr val="dk2"/>
+    </dgm:fillClrLst>
+    <dgm:linClrLst meth="repeat">
+      <a:schemeClr val="lt2"/>
+    </dgm:linClrLst>
+    <dgm:effectClrLst/>
+    <dgm:txLinClrLst/>
+    <dgm:txFillClrLst/>
+    <dgm:txEffectClrLst/>
+  </dgm:styleLbl>
+  <dgm:styleLbl name="parChTrans2D1">
+    <dgm:fillClrLst meth="repeat">
+      <a:schemeClr val="dk2">
+        <a:tint val="60000"/>
+      </a:schemeClr>
+    </dgm:fillClrLst>
+    <dgm:linClrLst meth="repeat">
+      <a:schemeClr val="dk2">
+        <a:tint val="60000"/>
+      </a:schemeClr>
+    </dgm:linClrLst>
+    <dgm:effectClrLst/>
+    <dgm:txLinClrLst/>
+    <dgm:txFillClrLst meth="repeat">
+      <a:schemeClr val="lt2"/>
+    </dgm:txFillClrLst>
+    <dgm:txEffectClrLst/>
+  </dgm:styleLbl>
+  <dgm:styleLbl name="parChTrans2D2">
+    <dgm:fillClrLst meth="repeat">
+      <a:schemeClr val="dk2"/>
+    </dgm:fillClrLst>
+    <dgm:linClrLst meth="repeat">
+      <a:schemeClr val="dk2"/>
+    </dgm:linClrLst>
+    <dgm:effectClrLst/>
+    <dgm:txLinClrLst/>
+    <dgm:txFillClrLst meth="repeat">
+      <a:schemeClr val="lt2"/>
+    </dgm:txFillClrLst>
+    <dgm:txEffectClrLst/>
+  </dgm:styleLbl>
+  <dgm:styleLbl name="parChTrans2D3">
+    <dgm:fillClrLst meth="repeat">
+      <a:schemeClr val="dk2"/>
+    </dgm:fillClrLst>
+    <dgm:linClrLst meth="repeat">
+      <a:schemeClr val="dk2"/>
+    </dgm:linClrLst>
+    <dgm:effectClrLst/>
+    <dgm:txLinClrLst/>
+    <dgm:txFillClrLst meth="repeat">
+      <a:schemeClr val="lt2"/>
+    </dgm:txFillClrLst>
+    <dgm:txEffectClrLst/>
+  </dgm:styleLbl>
+  <dgm:styleLbl name="parChTrans2D4">
+    <dgm:fillClrLst meth="repeat">
+      <a:schemeClr val="dk2"/>
+    </dgm:fillClrLst>
+    <dgm:linClrLst meth="repeat">
+      <a:schemeClr val="dk2"/>
+    </dgm:linClrLst>
+    <dgm:effectClrLst/>
+    <dgm:txLinClrLst/>
+    <dgm:txFillClrLst meth="repeat">
+      <a:schemeClr val="lt2"/>
+    </dgm:txFillClrLst>
+    <dgm:txEffectClrLst/>
+  </dgm:styleLbl>
+  <dgm:styleLbl name="parChTrans1D1">
+    <dgm:fillClrLst meth="repeat">
+      <a:schemeClr val="dk2"/>
+    </dgm:fillClrLst>
+    <dgm:linClrLst meth="repeat">
+      <a:schemeClr val="dk2">
+        <a:shade val="60000"/>
+      </a:schemeClr>
+    </dgm:linClrLst>
+    <dgm:effectClrLst/>
+    <dgm:txLinClrLst/>
+    <dgm:txFillClrLst meth="repeat">
+      <a:schemeClr val="tx1"/>
+    </dgm:txFillClrLst>
+    <dgm:txEffectClrLst/>
+  </dgm:styleLbl>
+  <dgm:styleLbl name="parChTrans1D2">
+    <dgm:fillClrLst meth="repeat">
+      <a:schemeClr val="dk2"/>
+    </dgm:fillClrLst>
+    <dgm:linClrLst meth="repeat">
+      <a:schemeClr val="dk2">
+        <a:shade val="60000"/>
+      </a:schemeClr>
+    </dgm:linClrLst>
+    <dgm:effectClrLst/>
+    <dgm:txLinClrLst/>
+    <dgm:txFillClrLst meth="repeat">
+      <a:schemeClr val="tx1"/>
+    </dgm:txFillClrLst>
+    <dgm:txEffectClrLst/>
+  </dgm:styleLbl>
+  <dgm:styleLbl name="parChTrans1D3">
+    <dgm:fillClrLst meth="repeat">
+      <a:schemeClr val="dk2"/>
+    </dgm:fillClrLst>
+    <dgm:linClrLst meth="repeat">
+      <a:schemeClr val="dk2">
+        <a:shade val="80000"/>
+      </a:schemeClr>
+    </dgm:linClrLst>
+    <dgm:effectClrLst/>
+    <dgm:txLinClrLst/>
+    <dgm:txFillClrLst meth="repeat">
+      <a:schemeClr val="tx1"/>
+    </dgm:txFillClrLst>
+    <dgm:txEffectClrLst/>
+  </dgm:styleLbl>
+  <dgm:styleLbl name="parChTrans1D4">
+    <dgm:fillClrLst meth="repeat">
+      <a:schemeClr val="dk2"/>
+    </dgm:fillClrLst>
+    <dgm:linClrLst meth="repeat">
+      <a:schemeClr val="dk2">
+        <a:shade val="80000"/>
+      </a:schemeClr>
+    </dgm:linClrLst>
+    <dgm:effectClrLst/>
+    <dgm:txLinClrLst/>
+    <dgm:txFillClrLst meth="repeat">
+      <a:schemeClr val="tx1"/>
+    </dgm:txFillClrLst>
+    <dgm:txEffectClrLst/>
+  </dgm:styleLbl>
+  <dgm:styleLbl name="fgAcc1">
+    <dgm:fillClrLst meth="repeat">
+      <a:schemeClr val="lt2">
+        <a:alpha val="90000"/>
+      </a:schemeClr>
+    </dgm:fillClrLst>
+    <dgm:linClrLst meth="repeat">
+      <a:schemeClr val="dk2"/>
+    </dgm:linClrLst>
+    <dgm:effectClrLst/>
+    <dgm:txLinClrLst/>
+    <dgm:txFillClrLst meth="repeat">
+      <a:schemeClr val="dk1"/>
+    </dgm:txFillClrLst>
+    <dgm:txEffectClrLst/>
+  </dgm:styleLbl>
+  <dgm:styleLbl name="conFgAcc1">
+    <dgm:fillClrLst meth="repeat">
+      <a:schemeClr val="lt2">
+        <a:alpha val="90000"/>
+      </a:schemeClr>
+    </dgm:fillClrLst>
+    <dgm:linClrLst meth="repeat">
+      <a:schemeClr val="dk2"/>
+    </dgm:linClrLst>
+    <dgm:effectClrLst/>
+    <dgm:txLinClrLst/>
+    <dgm:txFillClrLst meth="repeat">
+      <a:schemeClr val="dk1"/>
+    </dgm:txFillClrLst>
+    <dgm:txEffectClrLst/>
+  </dgm:styleLbl>
+  <dgm:styleLbl name="alignAcc1">
+    <dgm:fillClrLst meth="repeat">
+      <a:schemeClr val="lt2">
+        <a:alpha val="90000"/>
+      </a:schemeClr>
+    </dgm:fillClrLst>
+    <dgm:linClrLst meth="repeat">
+      <a:schemeClr val="dk2"/>
+    </dgm:linClrLst>
+    <dgm:effectClrLst/>
+    <dgm:txLinClrLst/>
+    <dgm:txFillClrLst meth="repeat">
+      <a:schemeClr val="dk1"/>
+    </dgm:txFillClrLst>
+    <dgm:txEffectClrLst/>
+  </dgm:styleLbl>
+  <dgm:styleLbl name="trAlignAcc1">
+    <dgm:fillClrLst meth="repeat">
+      <a:schemeClr val="lt2">
+        <a:alpha val="40000"/>
+      </a:schemeClr>
+    </dgm:fillClrLst>
+    <dgm:linClrLst meth="repeat">
+      <a:schemeClr val="dk2"/>
+    </dgm:linClrLst>
+    <dgm:effectClrLst/>
+    <dgm:txLinClrLst/>
+    <dgm:txFillClrLst meth="repeat">
+      <a:schemeClr val="dk1"/>
+    </dgm:txFillClrLst>
+    <dgm:txEffectClrLst/>
+  </dgm:styleLbl>
+  <dgm:styleLbl name="bgAcc1">
+    <dgm:fillClrLst meth="repeat">
+      <a:schemeClr val="lt2">
+        <a:alpha val="90000"/>
+      </a:schemeClr>
+    </dgm:fillClrLst>
+    <dgm:linClrLst meth="repeat">
+      <a:schemeClr val="dk2"/>
+    </dgm:linClrLst>
+    <dgm:effectClrLst/>
+    <dgm:txLinClrLst/>
+    <dgm:txFillClrLst meth="repeat">
+      <a:schemeClr val="dk1"/>
+    </dgm:txFillClrLst>
+    <dgm:txEffectClrLst/>
+  </dgm:styleLbl>
+  <dgm:styleLbl name="solidFgAcc1">
+    <dgm:fillClrLst meth="repeat">
+      <a:schemeClr val="lt2"/>
+    </dgm:fillClrLst>
+    <dgm:linClrLst meth="repeat">
+      <a:schemeClr val="dk2"/>
+    </dgm:linClrLst>
+    <dgm:effectClrLst/>
+    <dgm:txLinClrLst/>
+    <dgm:txFillClrLst meth="repeat">
+      <a:schemeClr val="dk1"/>
+    </dgm:txFillClrLst>
+    <dgm:txEffectClrLst/>
+  </dgm:styleLbl>
+  <dgm:styleLbl name="solidAlignAcc1">
+    <dgm:fillClrLst meth="repeat">
+      <a:schemeClr val="lt2"/>
+    </dgm:fillClrLst>
+    <dgm:linClrLst meth="repeat">
+      <a:schemeClr val="dk2"/>
+    </dgm:linClrLst>
+    <dgm:effectClrLst/>
+    <dgm:txLinClrLst/>
+    <dgm:txFillClrLst meth="repeat">
+      <a:schemeClr val="dk1"/>
+    </dgm:txFillClrLst>
+    <dgm:txEffectClrLst/>
+  </dgm:styleLbl>
+  <dgm:styleLbl name="solidBgAcc1">
+    <dgm:fillClrLst meth="repeat">
+      <a:schemeClr val="lt2"/>
+    </dgm:fillClrLst>
+    <dgm:linClrLst meth="repeat">
+      <a:schemeClr val="dk2"/>
+    </dgm:linClrLst>
+    <dgm:effectClrLst/>
+    <dgm:txLinClrLst/>
+    <dgm:txFillClrLst meth="repeat">
+      <a:schemeClr val="dk1"/>
+    </dgm:txFillClrLst>
+    <dgm:txEffectClrLst/>
+  </dgm:styleLbl>
+  <dgm:styleLbl name="fgAccFollowNode1">
+    <dgm:fillClrLst meth="repeat">
+      <a:schemeClr val="dk2">
+        <a:alpha val="90000"/>
+        <a:tint val="40000"/>
+      </a:schemeClr>
+    </dgm:fillClrLst>
+    <dgm:linClrLst meth="repeat">
+      <a:schemeClr val="dk2">
+        <a:alpha val="90000"/>
+        <a:tint val="40000"/>
+      </a:schemeClr>
+    </dgm:linClrLst>
+    <dgm:effectClrLst/>
+    <dgm:txLinClrLst/>
+    <dgm:txFillClrLst meth="repeat">
+      <a:schemeClr val="dk1"/>
+    </dgm:txFillClrLst>
+    <dgm:txEffectClrLst/>
+  </dgm:styleLbl>
+  <dgm:styleLbl name="alignAccFollowNode1">
+    <dgm:fillClrLst meth="repeat">
+      <a:schemeClr val="dk2">
+        <a:alpha val="90000"/>
+        <a:tint val="40000"/>
+      </a:schemeClr>
+    </dgm:fillClrLst>
+    <dgm:linClrLst meth="repeat">
+      <a:schemeClr val="dk2">
+        <a:alpha val="90000"/>
+        <a:tint val="40000"/>
+      </a:schemeClr>
+    </dgm:linClrLst>
+    <dgm:effectClrLst/>
+    <dgm:txLinClrLst/>
+    <dgm:txFillClrLst meth="repeat">
+      <a:schemeClr val="dk1"/>
+    </dgm:txFillClrLst>
+    <dgm:txEffectClrLst/>
+  </dgm:styleLbl>
+  <dgm:styleLbl name="bgAccFollowNode1">
+    <dgm:fillClrLst meth="repeat">
+      <a:schemeClr val="dk2">
+        <a:alpha val="90000"/>
+        <a:tint val="40000"/>
+      </a:schemeClr>
+    </dgm:fillClrLst>
+    <dgm:linClrLst meth="repeat">
+      <a:schemeClr val="dk2">
+        <a:alpha val="90000"/>
+        <a:tint val="40000"/>
+      </a:schemeClr>
+    </dgm:linClrLst>
+    <dgm:effectClrLst/>
+    <dgm:txLinClrLst/>
+    <dgm:txFillClrLst meth="repeat">
+      <a:schemeClr val="dk1"/>
+    </dgm:txFillClrLst>
+    <dgm:txEffectClrLst/>
+  </dgm:styleLbl>
+  <dgm:styleLbl name="fgAcc0">
+    <dgm:fillClrLst meth="repeat">
+      <a:schemeClr val="lt2">
+        <a:alpha val="90000"/>
+      </a:schemeClr>
+    </dgm:fillClrLst>
+    <dgm:linClrLst meth="repeat">
+      <a:schemeClr val="dk2"/>
+    </dgm:linClrLst>
+    <dgm:effectClrLst/>
+    <dgm:txLinClrLst/>
+    <dgm:txFillClrLst meth="repeat">
+      <a:schemeClr val="dk1"/>
+    </dgm:txFillClrLst>
+    <dgm:txEffectClrLst/>
+  </dgm:styleLbl>
+  <dgm:styleLbl name="fgAcc2">
+    <dgm:fillClrLst meth="repeat">
+      <a:schemeClr val="lt2">
+        <a:alpha val="90000"/>
+      </a:schemeClr>
+    </dgm:fillClrLst>
+    <dgm:linClrLst meth="repeat">
+      <a:schemeClr val="dk2"/>
+    </dgm:linClrLst>
+    <dgm:effectClrLst/>
+    <dgm:txLinClrLst/>
+    <dgm:txFillClrLst meth="repeat">
+      <a:schemeClr val="dk1"/>
+    </dgm:txFillClrLst>
+    <dgm:txEffectClrLst/>
+  </dgm:styleLbl>
+  <dgm:styleLbl name="fgAcc3">
+    <dgm:fillClrLst meth="repeat">
+      <a:schemeClr val="lt2">
+        <a:alpha val="90000"/>
+      </a:schemeClr>
+    </dgm:fillClrLst>
+    <dgm:linClrLst meth="repeat">
+      <a:schemeClr val="dk2"/>
+    </dgm:linClrLst>
+    <dgm:effectClrLst/>
+    <dgm:txLinClrLst/>
+    <dgm:txFillClrLst meth="repeat">
+      <a:schemeClr val="dk1"/>
+    </dgm:txFillClrLst>
+    <dgm:txEffectClrLst/>
+  </dgm:styleLbl>
+  <dgm:styleLbl name="fgAcc4">
+    <dgm:fillClrLst meth="repeat">
+      <a:schemeClr val="lt2">
+        <a:alpha val="90000"/>
+      </a:schemeClr>
+    </dgm:fillClrLst>
+    <dgm:linClrLst meth="repeat">
+      <a:schemeClr val="dk2"/>
+    </dgm:linClrLst>
+    <dgm:effectClrLst/>
+    <dgm:txLinClrLst/>
+    <dgm:txFillClrLst meth="repeat">
+      <a:schemeClr val="dk1"/>
+    </dgm:txFillClrLst>
+    <dgm:txEffectClrLst/>
+  </dgm:styleLbl>
+  <dgm:styleLbl name="bgShp">
+    <dgm:fillClrLst meth="repeat">
+      <a:schemeClr val="dk2">
+        <a:tint val="40000"/>
+      </a:schemeClr>
+    </dgm:fillClrLst>
+    <dgm:linClrLst meth="repeat">
+      <a:schemeClr val="dk2"/>
+    </dgm:linClrLst>
+    <dgm:effectClrLst/>
+    <dgm:txLinClrLst/>
+    <dgm:txFillClrLst meth="repeat">
+      <a:schemeClr val="dk1"/>
+    </dgm:txFillClrLst>
+    <dgm:txEffectClrLst/>
+  </dgm:styleLbl>
+  <dgm:styleLbl name="dkBgShp">
+    <dgm:fillClrLst meth="repeat">
+      <a:schemeClr val="dk2">
+        <a:shade val="80000"/>
+      </a:schemeClr>
+    </dgm:fillClrLst>
+    <dgm:linClrLst meth="repeat">
+      <a:schemeClr val="dk2"/>
+    </dgm:linClrLst>
+    <dgm:effectClrLst/>
+    <dgm:txLinClrLst/>
+    <dgm:txFillClrLst meth="repeat">
+      <a:schemeClr val="lt1"/>
+    </dgm:txFillClrLst>
+    <dgm:txEffectClrLst/>
+  </dgm:styleLbl>
+  <dgm:styleLbl name="trBgShp">
+    <dgm:fillClrLst meth="repeat">
+      <a:schemeClr val="dk2">
+        <a:tint val="50000"/>
+        <a:alpha val="40000"/>
+      </a:schemeClr>
+    </dgm:fillClrLst>
+    <dgm:linClrLst meth="repeat">
+      <a:schemeClr val="dk2"/>
+    </dgm:linClrLst>
+    <dgm:effectClrLst/>
+    <dgm:txLinClrLst/>
+    <dgm:txFillClrLst meth="repeat">
+      <a:schemeClr val="lt1"/>
+    </dgm:txFillClrLst>
+    <dgm:txEffectClrLst/>
+  </dgm:styleLbl>
+  <dgm:styleLbl name="fgShp">
+    <dgm:fillClrLst meth="repeat">
+      <a:schemeClr val="dk2">
+        <a:tint val="60000"/>
+      </a:schemeClr>
+    </dgm:fillClrLst>
+    <dgm:linClrLst meth="repeat">
+      <a:schemeClr val="lt2"/>
+    </dgm:linClrLst>
+    <dgm:effectClrLst/>
+    <dgm:txLinClrLst/>
+    <dgm:txFillClrLst meth="repeat">
+      <a:schemeClr val="dk1"/>
+    </dgm:txFillClrLst>
+    <dgm:txEffectClrLst/>
+  </dgm:styleLbl>
+  <dgm:styleLbl name="revTx">
+    <dgm:fillClrLst meth="repeat">
+      <a:schemeClr val="lt2">
         <a:alpha val="0"/>
       </a:schemeClr>
     </dgm:fillClrLst>
@@ -2678,22 +3434,22 @@
     </dgm:pt>
   </dgm:ptLst>
   <dgm:cxnLst>
+    <dgm:cxn modelId="{C8BFDA11-7F6A-EC4F-95E8-9F271F9FD6EB}" srcId="{05798F2C-491C-DA48-8F73-62D2D347D19A}" destId="{7606B3F6-2D3A-0948-B7D1-F0492B4D92B6}" srcOrd="0" destOrd="0" parTransId="{D985F1F7-1AA1-C045-A13E-84FB670194F1}" sibTransId="{272EBB5D-CF15-F14B-BFDD-B42D2AF049AC}"/>
+    <dgm:cxn modelId="{6CD88E55-1D83-B34C-A41A-0AB662E7278A}" srcId="{05798F2C-491C-DA48-8F73-62D2D347D19A}" destId="{DE26DFF0-5BD9-D44C-85A8-AB6D94D23CEA}" srcOrd="1" destOrd="0" parTransId="{32C137AC-9D33-9C44-BE8A-D5BC0165250D}" sibTransId="{7013C2D8-9812-C74A-95FC-359B30962387}"/>
+    <dgm:cxn modelId="{8C67BB19-B827-B942-B1AD-15898F46618D}" type="presOf" srcId="{DE26DFF0-5BD9-D44C-85A8-AB6D94D23CEA}" destId="{B5914069-2676-4146-9BCD-ED5DEE27F05F}" srcOrd="0" destOrd="0" presId="urn:microsoft.com/office/officeart/2009/3/layout/HorizontalOrganizationChart"/>
+    <dgm:cxn modelId="{5B1791B7-5E90-EE4A-B06D-5C99D5258BEB}" type="presOf" srcId="{E092BD50-81FD-BB4B-9156-94ADF0F28A38}" destId="{0D5404C8-5E72-3E42-BC95-9E4FD0923F5D}" srcOrd="0" destOrd="0" presId="urn:microsoft.com/office/officeart/2009/3/layout/HorizontalOrganizationChart"/>
+    <dgm:cxn modelId="{B877A11E-B868-1C40-AB4A-46E9A8B88E35}" srcId="{05798F2C-491C-DA48-8F73-62D2D347D19A}" destId="{878FBFF0-9766-EB4E-891D-366664B3C730}" srcOrd="2" destOrd="0" parTransId="{920D8734-1BAD-2F46-9544-5B077C69E11E}" sibTransId="{5602B141-D3B2-5A4D-9BCF-022866D45F41}"/>
     <dgm:cxn modelId="{83DFD5BD-4F89-8647-BC9E-BAE8C2BF3ED2}" srcId="{E092BD50-81FD-BB4B-9156-94ADF0F28A38}" destId="{05798F2C-491C-DA48-8F73-62D2D347D19A}" srcOrd="0" destOrd="0" parTransId="{68BFEFA0-4C9F-4A44-96F1-BA431442F41B}" sibTransId="{48740A2A-690D-A54A-8913-71A43E9085F8}"/>
+    <dgm:cxn modelId="{AB975606-714C-AE48-B3FC-2EBE453BFE6A}" type="presOf" srcId="{878FBFF0-9766-EB4E-891D-366664B3C730}" destId="{2D46C9E1-420B-B446-98F0-254210510C71}" srcOrd="0" destOrd="0" presId="urn:microsoft.com/office/officeart/2009/3/layout/HorizontalOrganizationChart"/>
+    <dgm:cxn modelId="{08D4B1CB-F206-1A44-887E-B63E6DC382BF}" type="presOf" srcId="{7606B3F6-2D3A-0948-B7D1-F0492B4D92B6}" destId="{C3FB921F-0DDC-CC4C-B229-2E0D62268550}" srcOrd="1" destOrd="0" presId="urn:microsoft.com/office/officeart/2009/3/layout/HorizontalOrganizationChart"/>
+    <dgm:cxn modelId="{68F1AE3F-73DA-5148-8F0B-D578A5BC92C7}" type="presOf" srcId="{D985F1F7-1AA1-C045-A13E-84FB670194F1}" destId="{9C365FDE-5EE8-5A43-835E-52E793649AED}" srcOrd="0" destOrd="0" presId="urn:microsoft.com/office/officeart/2009/3/layout/HorizontalOrganizationChart"/>
     <dgm:cxn modelId="{EA15EE8C-9C3F-BA47-ACAF-36858C067D3D}" type="presOf" srcId="{32C137AC-9D33-9C44-BE8A-D5BC0165250D}" destId="{EEC7A088-18CF-8345-AC79-A565B9C5ABAD}" srcOrd="0" destOrd="0" presId="urn:microsoft.com/office/officeart/2009/3/layout/HorizontalOrganizationChart"/>
-    <dgm:cxn modelId="{AB975606-714C-AE48-B3FC-2EBE453BFE6A}" type="presOf" srcId="{878FBFF0-9766-EB4E-891D-366664B3C730}" destId="{2D46C9E1-420B-B446-98F0-254210510C71}" srcOrd="0" destOrd="0" presId="urn:microsoft.com/office/officeart/2009/3/layout/HorizontalOrganizationChart"/>
+    <dgm:cxn modelId="{5FFF0902-1910-EE40-BAC5-B1D6F891DEF1}" type="presOf" srcId="{05798F2C-491C-DA48-8F73-62D2D347D19A}" destId="{961F4C91-8EBE-0D4A-88F4-80E0070C9CC1}" srcOrd="1" destOrd="0" presId="urn:microsoft.com/office/officeart/2009/3/layout/HorizontalOrganizationChart"/>
+    <dgm:cxn modelId="{11E3AA24-972D-6747-BCFE-089A426F2E31}" type="presOf" srcId="{920D8734-1BAD-2F46-9544-5B077C69E11E}" destId="{64B30988-DC77-A443-BBC9-3BA03B7EFFD6}" srcOrd="0" destOrd="0" presId="urn:microsoft.com/office/officeart/2009/3/layout/HorizontalOrganizationChart"/>
+    <dgm:cxn modelId="{DE3BCB7D-557D-5F48-8A33-B1B90BC432E3}" type="presOf" srcId="{05798F2C-491C-DA48-8F73-62D2D347D19A}" destId="{5C77F6CF-EEA0-8A41-ADE4-CBC74DE1B708}" srcOrd="0" destOrd="0" presId="urn:microsoft.com/office/officeart/2009/3/layout/HorizontalOrganizationChart"/>
+    <dgm:cxn modelId="{80E4D38E-0537-0947-B0E3-B48A47C3C7B2}" type="presOf" srcId="{DE26DFF0-5BD9-D44C-85A8-AB6D94D23CEA}" destId="{403D787F-5FAF-2748-A23D-0941C45FCD07}" srcOrd="1" destOrd="0" presId="urn:microsoft.com/office/officeart/2009/3/layout/HorizontalOrganizationChart"/>
     <dgm:cxn modelId="{D1B1BC9B-BC8F-2C43-8AE8-92A0605A0306}" type="presOf" srcId="{7606B3F6-2D3A-0948-B7D1-F0492B4D92B6}" destId="{C7363EB8-616C-FF42-AC99-9824F65EE5F3}" srcOrd="0" destOrd="0" presId="urn:microsoft.com/office/officeart/2009/3/layout/HorizontalOrganizationChart"/>
-    <dgm:cxn modelId="{B877A11E-B868-1C40-AB4A-46E9A8B88E35}" srcId="{05798F2C-491C-DA48-8F73-62D2D347D19A}" destId="{878FBFF0-9766-EB4E-891D-366664B3C730}" srcOrd="2" destOrd="0" parTransId="{920D8734-1BAD-2F46-9544-5B077C69E11E}" sibTransId="{5602B141-D3B2-5A4D-9BCF-022866D45F41}"/>
-    <dgm:cxn modelId="{8C67BB19-B827-B942-B1AD-15898F46618D}" type="presOf" srcId="{DE26DFF0-5BD9-D44C-85A8-AB6D94D23CEA}" destId="{B5914069-2676-4146-9BCD-ED5DEE27F05F}" srcOrd="0" destOrd="0" presId="urn:microsoft.com/office/officeart/2009/3/layout/HorizontalOrganizationChart"/>
-    <dgm:cxn modelId="{68F1AE3F-73DA-5148-8F0B-D578A5BC92C7}" type="presOf" srcId="{D985F1F7-1AA1-C045-A13E-84FB670194F1}" destId="{9C365FDE-5EE8-5A43-835E-52E793649AED}" srcOrd="0" destOrd="0" presId="urn:microsoft.com/office/officeart/2009/3/layout/HorizontalOrganizationChart"/>
-    <dgm:cxn modelId="{6CD88E55-1D83-B34C-A41A-0AB662E7278A}" srcId="{05798F2C-491C-DA48-8F73-62D2D347D19A}" destId="{DE26DFF0-5BD9-D44C-85A8-AB6D94D23CEA}" srcOrd="1" destOrd="0" parTransId="{32C137AC-9D33-9C44-BE8A-D5BC0165250D}" sibTransId="{7013C2D8-9812-C74A-95FC-359B30962387}"/>
-    <dgm:cxn modelId="{08D4B1CB-F206-1A44-887E-B63E6DC382BF}" type="presOf" srcId="{7606B3F6-2D3A-0948-B7D1-F0492B4D92B6}" destId="{C3FB921F-0DDC-CC4C-B229-2E0D62268550}" srcOrd="1" destOrd="0" presId="urn:microsoft.com/office/officeart/2009/3/layout/HorizontalOrganizationChart"/>
-    <dgm:cxn modelId="{DE3BCB7D-557D-5F48-8A33-B1B90BC432E3}" type="presOf" srcId="{05798F2C-491C-DA48-8F73-62D2D347D19A}" destId="{5C77F6CF-EEA0-8A41-ADE4-CBC74DE1B708}" srcOrd="0" destOrd="0" presId="urn:microsoft.com/office/officeart/2009/3/layout/HorizontalOrganizationChart"/>
-    <dgm:cxn modelId="{5B1791B7-5E90-EE4A-B06D-5C99D5258BEB}" type="presOf" srcId="{E092BD50-81FD-BB4B-9156-94ADF0F28A38}" destId="{0D5404C8-5E72-3E42-BC95-9E4FD0923F5D}" srcOrd="0" destOrd="0" presId="urn:microsoft.com/office/officeart/2009/3/layout/HorizontalOrganizationChart"/>
-    <dgm:cxn modelId="{C8BFDA11-7F6A-EC4F-95E8-9F271F9FD6EB}" srcId="{05798F2C-491C-DA48-8F73-62D2D347D19A}" destId="{7606B3F6-2D3A-0948-B7D1-F0492B4D92B6}" srcOrd="0" destOrd="0" parTransId="{D985F1F7-1AA1-C045-A13E-84FB670194F1}" sibTransId="{272EBB5D-CF15-F14B-BFDD-B42D2AF049AC}"/>
-    <dgm:cxn modelId="{5FFF0902-1910-EE40-BAC5-B1D6F891DEF1}" type="presOf" srcId="{05798F2C-491C-DA48-8F73-62D2D347D19A}" destId="{961F4C91-8EBE-0D4A-88F4-80E0070C9CC1}" srcOrd="1" destOrd="0" presId="urn:microsoft.com/office/officeart/2009/3/layout/HorizontalOrganizationChart"/>
     <dgm:cxn modelId="{F5E6D784-36D9-EF46-B855-185D869E146B}" type="presOf" srcId="{878FBFF0-9766-EB4E-891D-366664B3C730}" destId="{2FCC5E56-D1F4-7449-B4EB-D8F80C60898E}" srcOrd="1" destOrd="0" presId="urn:microsoft.com/office/officeart/2009/3/layout/HorizontalOrganizationChart"/>
-    <dgm:cxn modelId="{11E3AA24-972D-6747-BCFE-089A426F2E31}" type="presOf" srcId="{920D8734-1BAD-2F46-9544-5B077C69E11E}" destId="{64B30988-DC77-A443-BBC9-3BA03B7EFFD6}" srcOrd="0" destOrd="0" presId="urn:microsoft.com/office/officeart/2009/3/layout/HorizontalOrganizationChart"/>
-    <dgm:cxn modelId="{80E4D38E-0537-0947-B0E3-B48A47C3C7B2}" type="presOf" srcId="{DE26DFF0-5BD9-D44C-85A8-AB6D94D23CEA}" destId="{403D787F-5FAF-2748-A23D-0941C45FCD07}" srcOrd="1" destOrd="0" presId="urn:microsoft.com/office/officeart/2009/3/layout/HorizontalOrganizationChart"/>
     <dgm:cxn modelId="{F2D53C7F-2D07-AA41-A875-EC4605964815}" type="presParOf" srcId="{0D5404C8-5E72-3E42-BC95-9E4FD0923F5D}" destId="{F4EBCC91-D3C6-BD45-B967-518ADCF880A4}" srcOrd="0" destOrd="0" presId="urn:microsoft.com/office/officeart/2009/3/layout/HorizontalOrganizationChart"/>
     <dgm:cxn modelId="{9F613FE7-ABC7-5D4B-8691-13A54A32E64A}" type="presParOf" srcId="{F4EBCC91-D3C6-BD45-B967-518ADCF880A4}" destId="{7EC767FD-377B-9F47-BE6A-4DF91DBDAEA9}" srcOrd="0" destOrd="0" presId="urn:microsoft.com/office/officeart/2009/3/layout/HorizontalOrganizationChart"/>
     <dgm:cxn modelId="{E97FAC3F-2681-7543-A010-DFD7D5C77487}" type="presParOf" srcId="{7EC767FD-377B-9F47-BE6A-4DF91DBDAEA9}" destId="{5C77F6CF-EEA0-8A41-ADE4-CBC74DE1B708}" srcOrd="0" destOrd="0" presId="urn:microsoft.com/office/officeart/2009/3/layout/HorizontalOrganizationChart"/>
@@ -2730,6 +3486,133 @@
     </a:ext>
     <a:ext uri="{C62137D5-CB1D-491B-B009-E17868A290BF}">
       <dgm14:recolorImg xmlns:dgm14="http://schemas.microsoft.com/office/drawing/2010/diagram" val="1"/>
+    </a:ext>
+  </dgm:extLst>
+</dgm:dataModel>
+</file>
+
+<file path=ppt/diagrams/data3.xml><?xml version="1.0" encoding="utf-8"?>
+<dgm:dataModel xmlns:dgm="http://schemas.openxmlformats.org/drawingml/2006/diagram" xmlns:a="http://schemas.openxmlformats.org/drawingml/2006/main">
+  <dgm:ptLst>
+    <dgm:pt modelId="{853E72D7-617A-FD4E-95A2-A4C4F8BFC594}" type="doc">
+      <dgm:prSet loTypeId="urn:microsoft.com/office/officeart/2005/8/layout/hProcess3" loCatId="" qsTypeId="urn:microsoft.com/office/officeart/2005/8/quickstyle/simple4" qsCatId="simple" csTypeId="urn:microsoft.com/office/officeart/2005/8/colors/accent0_3" csCatId="mainScheme" phldr="0"/>
+      <dgm:spPr/>
+    </dgm:pt>
+    <dgm:pt modelId="{7035D950-9164-E346-AB0A-705FDB3271AA}">
+      <dgm:prSet phldrT="[Texto]" phldr="1"/>
+      <dgm:spPr/>
+      <dgm:t>
+        <a:bodyPr/>
+        <a:lstStyle/>
+        <a:p>
+          <a:endParaRPr lang="es-ES_tradnl"/>
+        </a:p>
+      </dgm:t>
+    </dgm:pt>
+    <dgm:pt modelId="{F00A6ABD-4EA5-C848-8560-C95DC72D9AC3}" type="parTrans" cxnId="{0B31EA62-AC6E-7548-86DE-0F6BE5FD31AA}">
+      <dgm:prSet/>
+      <dgm:spPr/>
+      <dgm:t>
+        <a:bodyPr/>
+        <a:lstStyle/>
+        <a:p>
+          <a:endParaRPr lang="es-ES_tradnl"/>
+        </a:p>
+      </dgm:t>
+    </dgm:pt>
+    <dgm:pt modelId="{80716D97-5A42-924E-AECC-B8106F00EBE9}" type="sibTrans" cxnId="{0B31EA62-AC6E-7548-86DE-0F6BE5FD31AA}">
+      <dgm:prSet/>
+      <dgm:spPr/>
+      <dgm:t>
+        <a:bodyPr/>
+        <a:lstStyle/>
+        <a:p>
+          <a:endParaRPr lang="es-ES_tradnl"/>
+        </a:p>
+      </dgm:t>
+    </dgm:pt>
+    <dgm:pt modelId="{7B05856A-7F95-B142-A162-D57BA93B5FCE}" type="pres">
+      <dgm:prSet presAssocID="{853E72D7-617A-FD4E-95A2-A4C4F8BFC594}" presName="Name0" presStyleCnt="0">
+        <dgm:presLayoutVars>
+          <dgm:dir/>
+          <dgm:animLvl val="lvl"/>
+          <dgm:resizeHandles val="exact"/>
+        </dgm:presLayoutVars>
+      </dgm:prSet>
+      <dgm:spPr/>
+    </dgm:pt>
+    <dgm:pt modelId="{F6AEDADC-0069-244B-B7E3-1FC56BFD004A}" type="pres">
+      <dgm:prSet presAssocID="{853E72D7-617A-FD4E-95A2-A4C4F8BFC594}" presName="dummy" presStyleCnt="0"/>
+      <dgm:spPr/>
+    </dgm:pt>
+    <dgm:pt modelId="{09615C0F-6F3E-6D41-84A2-167136505EFD}" type="pres">
+      <dgm:prSet presAssocID="{853E72D7-617A-FD4E-95A2-A4C4F8BFC594}" presName="linH" presStyleCnt="0"/>
+      <dgm:spPr/>
+    </dgm:pt>
+    <dgm:pt modelId="{8027A346-C94C-1A41-A4C1-11A9FC586D4F}" type="pres">
+      <dgm:prSet presAssocID="{853E72D7-617A-FD4E-95A2-A4C4F8BFC594}" presName="padding1" presStyleCnt="0"/>
+      <dgm:spPr/>
+    </dgm:pt>
+    <dgm:pt modelId="{A1EF4E22-809C-6B43-8082-84731A05F9C1}" type="pres">
+      <dgm:prSet presAssocID="{7035D950-9164-E346-AB0A-705FDB3271AA}" presName="linV" presStyleCnt="0"/>
+      <dgm:spPr/>
+    </dgm:pt>
+    <dgm:pt modelId="{9393383E-C9A7-204A-92C1-EBCB7B5453DF}" type="pres">
+      <dgm:prSet presAssocID="{7035D950-9164-E346-AB0A-705FDB3271AA}" presName="spVertical1" presStyleCnt="0"/>
+      <dgm:spPr/>
+    </dgm:pt>
+    <dgm:pt modelId="{1B49270B-8A14-2C43-8DD4-FA78AC800699}" type="pres">
+      <dgm:prSet presAssocID="{7035D950-9164-E346-AB0A-705FDB3271AA}" presName="parTx" presStyleLbl="revTx" presStyleIdx="0" presStyleCnt="1">
+        <dgm:presLayoutVars>
+          <dgm:chMax val="0"/>
+          <dgm:chPref val="0"/>
+          <dgm:bulletEnabled val="1"/>
+        </dgm:presLayoutVars>
+      </dgm:prSet>
+      <dgm:spPr/>
+    </dgm:pt>
+    <dgm:pt modelId="{5CAC891E-8CE5-BA4A-BD8A-4ADBAB702B14}" type="pres">
+      <dgm:prSet presAssocID="{7035D950-9164-E346-AB0A-705FDB3271AA}" presName="spVertical2" presStyleCnt="0"/>
+      <dgm:spPr/>
+    </dgm:pt>
+    <dgm:pt modelId="{8577A867-A5FF-4045-82AF-3BD0F6EF5C9D}" type="pres">
+      <dgm:prSet presAssocID="{7035D950-9164-E346-AB0A-705FDB3271AA}" presName="spVertical3" presStyleCnt="0"/>
+      <dgm:spPr/>
+    </dgm:pt>
+    <dgm:pt modelId="{B6113B95-7464-3E45-A458-9E83DD9EF172}" type="pres">
+      <dgm:prSet presAssocID="{853E72D7-617A-FD4E-95A2-A4C4F8BFC594}" presName="padding2" presStyleCnt="0"/>
+      <dgm:spPr/>
+    </dgm:pt>
+    <dgm:pt modelId="{7601D38C-1841-7B4B-B1EE-41D1104F213B}" type="pres">
+      <dgm:prSet presAssocID="{853E72D7-617A-FD4E-95A2-A4C4F8BFC594}" presName="negArrow" presStyleCnt="0"/>
+      <dgm:spPr/>
+    </dgm:pt>
+    <dgm:pt modelId="{27C15A38-9159-2E47-B4EA-2DE453D677AB}" type="pres">
+      <dgm:prSet presAssocID="{853E72D7-617A-FD4E-95A2-A4C4F8BFC594}" presName="backgroundArrow" presStyleLbl="node1" presStyleIdx="0" presStyleCnt="1" custLinFactY="9668" custLinFactNeighborX="76392" custLinFactNeighborY="100000"/>
+      <dgm:spPr/>
+    </dgm:pt>
+  </dgm:ptLst>
+  <dgm:cxnLst>
+    <dgm:cxn modelId="{CB2FEE9F-D3CC-D644-84D4-0E4FA2075307}" type="presOf" srcId="{7035D950-9164-E346-AB0A-705FDB3271AA}" destId="{1B49270B-8A14-2C43-8DD4-FA78AC800699}" srcOrd="0" destOrd="0" presId="urn:microsoft.com/office/officeart/2005/8/layout/hProcess3"/>
+    <dgm:cxn modelId="{CB331A76-919F-7D45-864C-F4730F16570F}" type="presOf" srcId="{853E72D7-617A-FD4E-95A2-A4C4F8BFC594}" destId="{7B05856A-7F95-B142-A162-D57BA93B5FCE}" srcOrd="0" destOrd="0" presId="urn:microsoft.com/office/officeart/2005/8/layout/hProcess3"/>
+    <dgm:cxn modelId="{0B31EA62-AC6E-7548-86DE-0F6BE5FD31AA}" srcId="{853E72D7-617A-FD4E-95A2-A4C4F8BFC594}" destId="{7035D950-9164-E346-AB0A-705FDB3271AA}" srcOrd="0" destOrd="0" parTransId="{F00A6ABD-4EA5-C848-8560-C95DC72D9AC3}" sibTransId="{80716D97-5A42-924E-AECC-B8106F00EBE9}"/>
+    <dgm:cxn modelId="{38B3BA66-AB66-0549-BD5F-F37F2433D4FD}" type="presParOf" srcId="{7B05856A-7F95-B142-A162-D57BA93B5FCE}" destId="{F6AEDADC-0069-244B-B7E3-1FC56BFD004A}" srcOrd="0" destOrd="0" presId="urn:microsoft.com/office/officeart/2005/8/layout/hProcess3"/>
+    <dgm:cxn modelId="{FE7C3709-F6D4-D94D-8B91-C31A3AE71B4F}" type="presParOf" srcId="{7B05856A-7F95-B142-A162-D57BA93B5FCE}" destId="{09615C0F-6F3E-6D41-84A2-167136505EFD}" srcOrd="1" destOrd="0" presId="urn:microsoft.com/office/officeart/2005/8/layout/hProcess3"/>
+    <dgm:cxn modelId="{42DCACF0-817B-394C-9187-865724C00C3F}" type="presParOf" srcId="{09615C0F-6F3E-6D41-84A2-167136505EFD}" destId="{8027A346-C94C-1A41-A4C1-11A9FC586D4F}" srcOrd="0" destOrd="0" presId="urn:microsoft.com/office/officeart/2005/8/layout/hProcess3"/>
+    <dgm:cxn modelId="{6E683BB5-5E87-F548-AED6-3A2FDF9C656F}" type="presParOf" srcId="{09615C0F-6F3E-6D41-84A2-167136505EFD}" destId="{A1EF4E22-809C-6B43-8082-84731A05F9C1}" srcOrd="1" destOrd="0" presId="urn:microsoft.com/office/officeart/2005/8/layout/hProcess3"/>
+    <dgm:cxn modelId="{BD6209C3-DFF7-E74B-9AF6-DD17967A54C0}" type="presParOf" srcId="{A1EF4E22-809C-6B43-8082-84731A05F9C1}" destId="{9393383E-C9A7-204A-92C1-EBCB7B5453DF}" srcOrd="0" destOrd="0" presId="urn:microsoft.com/office/officeart/2005/8/layout/hProcess3"/>
+    <dgm:cxn modelId="{2801E1D0-FB09-874A-8F50-C763384181B1}" type="presParOf" srcId="{A1EF4E22-809C-6B43-8082-84731A05F9C1}" destId="{1B49270B-8A14-2C43-8DD4-FA78AC800699}" srcOrd="1" destOrd="0" presId="urn:microsoft.com/office/officeart/2005/8/layout/hProcess3"/>
+    <dgm:cxn modelId="{FF6550DB-9774-5343-AE2E-442B93D55183}" type="presParOf" srcId="{A1EF4E22-809C-6B43-8082-84731A05F9C1}" destId="{5CAC891E-8CE5-BA4A-BD8A-4ADBAB702B14}" srcOrd="2" destOrd="0" presId="urn:microsoft.com/office/officeart/2005/8/layout/hProcess3"/>
+    <dgm:cxn modelId="{FB1C74FC-1D79-E940-A217-D7E97A3045EE}" type="presParOf" srcId="{A1EF4E22-809C-6B43-8082-84731A05F9C1}" destId="{8577A867-A5FF-4045-82AF-3BD0F6EF5C9D}" srcOrd="3" destOrd="0" presId="urn:microsoft.com/office/officeart/2005/8/layout/hProcess3"/>
+    <dgm:cxn modelId="{F9B81E10-938B-5245-80C7-6C8115DFA3D3}" type="presParOf" srcId="{09615C0F-6F3E-6D41-84A2-167136505EFD}" destId="{B6113B95-7464-3E45-A458-9E83DD9EF172}" srcOrd="2" destOrd="0" presId="urn:microsoft.com/office/officeart/2005/8/layout/hProcess3"/>
+    <dgm:cxn modelId="{5B8837D6-B0B8-4F41-97C3-B7B50A40EE01}" type="presParOf" srcId="{09615C0F-6F3E-6D41-84A2-167136505EFD}" destId="{7601D38C-1841-7B4B-B1EE-41D1104F213B}" srcOrd="3" destOrd="0" presId="urn:microsoft.com/office/officeart/2005/8/layout/hProcess3"/>
+    <dgm:cxn modelId="{8B79D396-6F46-3043-B0B2-48B716FD81F2}" type="presParOf" srcId="{09615C0F-6F3E-6D41-84A2-167136505EFD}" destId="{27C15A38-9159-2E47-B4EA-2DE453D677AB}" srcOrd="4" destOrd="0" presId="urn:microsoft.com/office/officeart/2005/8/layout/hProcess3"/>
+  </dgm:cxnLst>
+  <dgm:bg/>
+  <dgm:whole/>
+  <dgm:extLst>
+    <a:ext uri="http://schemas.microsoft.com/office/drawing/2008/diagram">
+      <dsp:dataModelExt xmlns:dsp="http://schemas.microsoft.com/office/drawing/2008/diagram" relId="rId9" minVer="http://schemas.openxmlformats.org/drawingml/2006/diagram"/>
     </a:ext>
   </dgm:extLst>
 </dgm:dataModel>
@@ -3916,6 +4799,138 @@
       <dsp:txXfrm>
         <a:off x="2694489" y="2098653"/>
         <a:ext cx="2243397" cy="684236"/>
+      </dsp:txXfrm>
+    </dsp:sp>
+  </dsp:spTree>
+</dsp:drawing>
+</file>
+
+<file path=ppt/diagrams/drawing3.xml><?xml version="1.0" encoding="utf-8"?>
+<dsp:drawing xmlns:dgm="http://schemas.openxmlformats.org/drawingml/2006/diagram" xmlns:dsp="http://schemas.microsoft.com/office/drawing/2008/diagram" xmlns:a="http://schemas.openxmlformats.org/drawingml/2006/main">
+  <dsp:spTree>
+    <dsp:nvGrpSpPr>
+      <dsp:cNvPr id="0" name=""/>
+      <dsp:cNvGrpSpPr/>
+    </dsp:nvGrpSpPr>
+    <dsp:grpSpPr/>
+    <dsp:sp modelId="{27C15A38-9159-2E47-B4EA-2DE453D677AB}">
+      <dsp:nvSpPr>
+        <dsp:cNvPr id="0" name=""/>
+        <dsp:cNvSpPr/>
+      </dsp:nvSpPr>
+      <dsp:spPr>
+        <a:xfrm>
+          <a:off x="0" y="28715"/>
+          <a:ext cx="1903896" cy="1584000"/>
+        </a:xfrm>
+        <a:prstGeom prst="rightArrow">
+          <a:avLst/>
+        </a:prstGeom>
+        <a:gradFill rotWithShape="0">
+          <a:gsLst>
+            <a:gs pos="0">
+              <a:schemeClr val="dk2">
+                <a:hueOff val="0"/>
+                <a:satOff val="0"/>
+                <a:lumOff val="0"/>
+                <a:alphaOff val="0"/>
+                <a:tint val="98000"/>
+                <a:lumMod val="114000"/>
+              </a:schemeClr>
+            </a:gs>
+            <a:gs pos="100000">
+              <a:schemeClr val="dk2">
+                <a:hueOff val="0"/>
+                <a:satOff val="0"/>
+                <a:lumOff val="0"/>
+                <a:alphaOff val="0"/>
+                <a:shade val="90000"/>
+                <a:lumMod val="84000"/>
+              </a:schemeClr>
+            </a:gs>
+          </a:gsLst>
+          <a:lin ang="5400000" scaled="0"/>
+        </a:gradFill>
+        <a:ln>
+          <a:noFill/>
+        </a:ln>
+        <a:effectLst>
+          <a:outerShdw blurRad="38100" dist="25400" dir="5400000" rotWithShape="0">
+            <a:srgbClr val="000000">
+              <a:alpha val="45000"/>
+            </a:srgbClr>
+          </a:outerShdw>
+        </a:effectLst>
+      </dsp:spPr>
+      <dsp:style>
+        <a:lnRef idx="0">
+          <a:scrgbClr r="0" g="0" b="0"/>
+        </a:lnRef>
+        <a:fillRef idx="3">
+          <a:scrgbClr r="0" g="0" b="0"/>
+        </a:fillRef>
+        <a:effectRef idx="2">
+          <a:scrgbClr r="0" g="0" b="0"/>
+        </a:effectRef>
+        <a:fontRef idx="minor">
+          <a:schemeClr val="lt1"/>
+        </a:fontRef>
+      </dsp:style>
+    </dsp:sp>
+    <dsp:sp modelId="{1B49270B-8A14-2C43-8DD4-FA78AC800699}">
+      <dsp:nvSpPr>
+        <dsp:cNvPr id="0" name=""/>
+        <dsp:cNvSpPr/>
+      </dsp:nvSpPr>
+      <dsp:spPr>
+        <a:xfrm>
+          <a:off x="153575" y="410357"/>
+          <a:ext cx="1559930" cy="792000"/>
+        </a:xfrm>
+        <a:prstGeom prst="rect">
+          <a:avLst/>
+        </a:prstGeom>
+        <a:noFill/>
+        <a:ln>
+          <a:noFill/>
+        </a:ln>
+        <a:effectLst/>
+      </dsp:spPr>
+      <dsp:style>
+        <a:lnRef idx="0">
+          <a:scrgbClr r="0" g="0" b="0"/>
+        </a:lnRef>
+        <a:fillRef idx="0">
+          <a:scrgbClr r="0" g="0" b="0"/>
+        </a:fillRef>
+        <a:effectRef idx="0">
+          <a:scrgbClr r="0" g="0" b="0"/>
+        </a:effectRef>
+        <a:fontRef idx="minor"/>
+      </dsp:style>
+      <dsp:txBody>
+        <a:bodyPr spcFirstLastPara="0" vert="horz" wrap="square" lIns="0" tIns="223520" rIns="0" bIns="223520" numCol="1" spcCol="1270" anchor="ctr" anchorCtr="0">
+          <a:noAutofit/>
+        </a:bodyPr>
+        <a:lstStyle/>
+        <a:p>
+          <a:pPr lvl="0" algn="ctr" defTabSz="977900">
+            <a:lnSpc>
+              <a:spcPct val="90000"/>
+            </a:lnSpc>
+            <a:spcBef>
+              <a:spcPct val="0"/>
+            </a:spcBef>
+            <a:spcAft>
+              <a:spcPct val="35000"/>
+            </a:spcAft>
+          </a:pPr>
+          <a:endParaRPr lang="es-ES_tradnl" sz="2200" kern="1200"/>
+        </a:p>
+      </dsp:txBody>
+      <dsp:txXfrm>
+        <a:off x="153575" y="410357"/>
+        <a:ext cx="1559930" cy="792000"/>
       </dsp:txXfrm>
     </dsp:sp>
   </dsp:spTree>
@@ -5315,6 +6330,321 @@
 </dgm:layoutDef>
 </file>
 
+<file path=ppt/diagrams/layout3.xml><?xml version="1.0" encoding="utf-8"?>
+<dgm:layoutDef xmlns:dgm="http://schemas.openxmlformats.org/drawingml/2006/diagram" xmlns:a="http://schemas.openxmlformats.org/drawingml/2006/main" uniqueId="urn:microsoft.com/office/officeart/2005/8/layout/hProcess3">
+  <dgm:title val=""/>
+  <dgm:desc val=""/>
+  <dgm:catLst>
+    <dgm:cat type="process" pri="6000"/>
+  </dgm:catLst>
+  <dgm:sampData useDef="1">
+    <dgm:dataModel>
+      <dgm:ptLst/>
+      <dgm:bg/>
+      <dgm:whole/>
+    </dgm:dataModel>
+  </dgm:sampData>
+  <dgm:styleData>
+    <dgm:dataModel>
+      <dgm:ptLst>
+        <dgm:pt modelId="0" type="doc"/>
+        <dgm:pt modelId="1"/>
+        <dgm:pt modelId="2"/>
+      </dgm:ptLst>
+      <dgm:cxnLst>
+        <dgm:cxn modelId="3" srcId="0" destId="1" srcOrd="0" destOrd="0"/>
+        <dgm:cxn modelId="4" srcId="0" destId="2" srcOrd="1" destOrd="0"/>
+      </dgm:cxnLst>
+      <dgm:bg/>
+      <dgm:whole/>
+    </dgm:dataModel>
+  </dgm:styleData>
+  <dgm:clrData>
+    <dgm:dataModel>
+      <dgm:ptLst>
+        <dgm:pt modelId="0" type="doc"/>
+        <dgm:pt modelId="1"/>
+        <dgm:pt modelId="2"/>
+        <dgm:pt modelId="3"/>
+        <dgm:pt modelId="4"/>
+      </dgm:ptLst>
+      <dgm:cxnLst>
+        <dgm:cxn modelId="5" srcId="0" destId="1" srcOrd="0" destOrd="0"/>
+        <dgm:cxn modelId="6" srcId="0" destId="2" srcOrd="1" destOrd="0"/>
+        <dgm:cxn modelId="7" srcId="0" destId="3" srcOrd="2" destOrd="0"/>
+        <dgm:cxn modelId="8" srcId="0" destId="4" srcOrd="3" destOrd="0"/>
+      </dgm:cxnLst>
+      <dgm:bg/>
+      <dgm:whole/>
+    </dgm:dataModel>
+  </dgm:clrData>
+  <dgm:layoutNode name="Name0" chOrder="t">
+    <dgm:varLst>
+      <dgm:dir/>
+      <dgm:animLvl val="lvl"/>
+      <dgm:resizeHandles val="exact"/>
+    </dgm:varLst>
+    <dgm:alg type="composite"/>
+    <dgm:shape xmlns:r="http://schemas.openxmlformats.org/officeDocument/2006/relationships" r:blip="">
+      <dgm:adjLst/>
+    </dgm:shape>
+    <dgm:presOf/>
+    <dgm:constrLst>
+      <dgm:constr type="w" for="ch" forName="dummy" refType="w"/>
+      <dgm:constr type="h" for="ch" forName="dummy" refType="h"/>
+      <dgm:constr type="h" for="ch" forName="dummy" refType="w" refFor="ch" refForName="dummy" op="lte" fact="0.4"/>
+      <dgm:constr type="ctrX" for="ch" forName="dummy" refType="w" fact="0.5"/>
+      <dgm:constr type="ctrY" for="ch" forName="dummy" refType="h" fact="0.5"/>
+      <dgm:constr type="w" for="ch" forName="linH" refType="w"/>
+      <dgm:constr type="h" for="ch" forName="linH" refType="h"/>
+      <dgm:constr type="ctrX" for="ch" forName="linH" refType="w" fact="0.5"/>
+      <dgm:constr type="ctrY" for="ch" forName="linH" refType="h" fact="0.5"/>
+      <dgm:constr type="userP" for="ch" forName="linH" refType="h" refFor="ch" refForName="dummy" fact="0.25"/>
+      <dgm:constr type="userT" for="des" forName="parTx" refType="w" refFor="ch" refForName="dummy" fact="0.2"/>
+    </dgm:constrLst>
+    <dgm:ruleLst/>
+    <dgm:layoutNode name="dummy">
+      <dgm:alg type="sp"/>
+      <dgm:shape xmlns:r="http://schemas.openxmlformats.org/officeDocument/2006/relationships" r:blip="">
+        <dgm:adjLst/>
+      </dgm:shape>
+      <dgm:presOf/>
+      <dgm:constrLst/>
+      <dgm:ruleLst/>
+    </dgm:layoutNode>
+    <dgm:layoutNode name="linH">
+      <dgm:choose name="Name1">
+        <dgm:if name="Name2" func="var" arg="dir" op="equ" val="norm">
+          <dgm:alg type="lin">
+            <dgm:param type="linDir" val="fromL"/>
+            <dgm:param type="nodeVertAlign" val="t"/>
+          </dgm:alg>
+        </dgm:if>
+        <dgm:else name="Name3">
+          <dgm:alg type="lin">
+            <dgm:param type="linDir" val="fromR"/>
+            <dgm:param type="nodeVertAlign" val="t"/>
+          </dgm:alg>
+        </dgm:else>
+      </dgm:choose>
+      <dgm:shape xmlns:r="http://schemas.openxmlformats.org/officeDocument/2006/relationships" r:blip="">
+        <dgm:adjLst/>
+      </dgm:shape>
+      <dgm:presOf/>
+      <dgm:constrLst>
+        <dgm:constr type="primFontSz" for="des" forName="parTx" val="65"/>
+        <dgm:constr type="primFontSz" for="des" forName="desTx" refType="primFontSz" refFor="des" refForName="parTx" op="equ"/>
+        <dgm:constr type="h" for="des" forName="parTx" refType="primFontSz" refFor="des" refForName="parTx"/>
+        <dgm:constr type="h" for="des" forName="desTx" refType="primFontSz" refFor="des" refForName="parTx" fact="0.5"/>
+        <dgm:constr type="h" for="des" forName="parTx" op="equ"/>
+        <dgm:constr type="h" for="des" forName="desTx" op="equ"/>
+        <dgm:constr type="h" for="ch" forName="backgroundArrow" refType="primFontSz" refFor="des" refForName="parTx" fact="2"/>
+        <dgm:constr type="h" for="ch" forName="backgroundArrow" refType="h" refFor="des" refForName="parTx" op="lte" fact="2"/>
+        <dgm:constr type="h" for="ch" forName="backgroundArrow" refType="h" refFor="des" refForName="parTx" op="gte" fact="2"/>
+        <dgm:constr type="h" for="des" forName="spVertical1" refType="primFontSz" refFor="des" refForName="parTx" fact="0.5"/>
+        <dgm:constr type="h" for="des" forName="spVertical1" refType="h" refFor="des" refForName="parTx" op="lte" fact="0.5"/>
+        <dgm:constr type="h" for="des" forName="spVertical1" refType="h" refFor="des" refForName="parTx" op="gte" fact="0.5"/>
+        <dgm:constr type="h" for="des" forName="spVertical2" refType="primFontSz" refFor="des" refForName="parTx" fact="0.5"/>
+        <dgm:constr type="h" for="des" forName="spVertical2" refType="h" refFor="des" refForName="parTx" op="lte" fact="0.5"/>
+        <dgm:constr type="h" for="des" forName="spVertical2" refType="h" refFor="des" refForName="parTx" op="gte" fact="0.5"/>
+        <dgm:constr type="h" for="des" forName="spVertical3" refType="primFontSz" refFor="des" refForName="parTx" fact="-0.4"/>
+        <dgm:constr type="h" for="des" forName="spVertical3" refType="h" refFor="des" refForName="parTx" op="lte" fact="-0.4"/>
+        <dgm:constr type="h" for="des" forName="spVertical3" refType="h" refFor="des" refForName="parTx" op="gte" fact="-0.4"/>
+        <dgm:constr type="w" for="ch" forName="backgroundArrow" refType="w"/>
+        <dgm:constr type="w" for="ch" forName="negArrow" refType="w" fact="-1"/>
+        <dgm:constr type="w" for="ch" forName="linV" refType="w"/>
+        <dgm:constr type="w" for="ch" forName="space" refType="w" refFor="ch" refForName="linV" fact="0.2"/>
+        <dgm:constr type="w" for="ch" forName="padding1" refType="w" fact="0.08"/>
+        <dgm:constr type="userP"/>
+        <dgm:constr type="w" for="ch" forName="padding2" refType="userP"/>
+      </dgm:constrLst>
+      <dgm:ruleLst>
+        <dgm:rule type="w" for="ch" forName="linV" val="0" fact="NaN" max="NaN"/>
+        <dgm:rule type="primFontSz" for="des" forName="parTx" val="5" fact="NaN" max="NaN"/>
+      </dgm:ruleLst>
+      <dgm:layoutNode name="padding1">
+        <dgm:alg type="sp"/>
+        <dgm:shape xmlns:r="http://schemas.openxmlformats.org/officeDocument/2006/relationships" r:blip="">
+          <dgm:adjLst/>
+        </dgm:shape>
+        <dgm:presOf/>
+        <dgm:constrLst/>
+        <dgm:ruleLst/>
+      </dgm:layoutNode>
+      <dgm:forEach name="Name4" axis="ch" ptType="node">
+        <dgm:layoutNode name="linV">
+          <dgm:alg type="lin">
+            <dgm:param type="linDir" val="fromT"/>
+          </dgm:alg>
+          <dgm:shape xmlns:r="http://schemas.openxmlformats.org/officeDocument/2006/relationships" r:blip="">
+            <dgm:adjLst/>
+          </dgm:shape>
+          <dgm:presOf/>
+          <dgm:constrLst>
+            <dgm:constr type="w" for="ch" forName="spVertical1" refType="w"/>
+            <dgm:constr type="w" for="ch" forName="parTx" refType="w"/>
+            <dgm:constr type="w" for="ch" forName="spVertical2" refType="w"/>
+            <dgm:constr type="w" for="ch" forName="spVertical3" refType="w"/>
+            <dgm:constr type="w" for="ch" forName="desTx" refType="w"/>
+          </dgm:constrLst>
+          <dgm:ruleLst/>
+          <dgm:layoutNode name="spVertical1">
+            <dgm:alg type="sp"/>
+            <dgm:shape xmlns:r="http://schemas.openxmlformats.org/officeDocument/2006/relationships" r:blip="">
+              <dgm:adjLst/>
+            </dgm:shape>
+            <dgm:presOf/>
+            <dgm:constrLst/>
+            <dgm:ruleLst/>
+          </dgm:layoutNode>
+          <dgm:layoutNode name="parTx" styleLbl="revTx">
+            <dgm:varLst>
+              <dgm:chMax val="0"/>
+              <dgm:chPref val="0"/>
+              <dgm:bulletEnabled val="1"/>
+            </dgm:varLst>
+            <dgm:choose name="Name5">
+              <dgm:if name="Name6" axis="root des" ptType="all node" func="maxDepth" op="gt" val="1">
+                <dgm:alg type="tx">
+                  <dgm:param type="parTxLTRAlign" val="l"/>
+                  <dgm:param type="parTxRTLAlign" val="r"/>
+                </dgm:alg>
+              </dgm:if>
+              <dgm:else name="Name7">
+                <dgm:alg type="tx">
+                  <dgm:param type="parTxLTRAlign" val="ctr"/>
+                  <dgm:param type="parTxRTLAlign" val="ctr"/>
+                </dgm:alg>
+              </dgm:else>
+            </dgm:choose>
+            <dgm:shape xmlns:r="http://schemas.openxmlformats.org/officeDocument/2006/relationships" type="rect" r:blip="">
+              <dgm:adjLst/>
+            </dgm:shape>
+            <dgm:presOf axis="self" ptType="node"/>
+            <dgm:choose name="Name8">
+              <dgm:if name="Name9" func="var" arg="dir" op="equ" val="norm">
+                <dgm:constrLst>
+                  <dgm:constr type="userT"/>
+                  <dgm:constr type="h" refType="userT" op="lte"/>
+                  <dgm:constr type="tMarg" refType="primFontSz" fact="0.8"/>
+                  <dgm:constr type="bMarg" refType="tMarg"/>
+                  <dgm:constr type="lMarg"/>
+                  <dgm:constr type="rMarg"/>
+                </dgm:constrLst>
+              </dgm:if>
+              <dgm:else name="Name10">
+                <dgm:constrLst>
+                  <dgm:constr type="userT"/>
+                  <dgm:constr type="h" refType="userT" op="lte"/>
+                  <dgm:constr type="tMarg" refType="primFontSz" fact="0.8"/>
+                  <dgm:constr type="bMarg" refType="tMarg"/>
+                  <dgm:constr type="lMarg"/>
+                  <dgm:constr type="rMarg"/>
+                </dgm:constrLst>
+              </dgm:else>
+            </dgm:choose>
+            <dgm:ruleLst>
+              <dgm:rule type="h" val="INF" fact="NaN" max="NaN"/>
+            </dgm:ruleLst>
+          </dgm:layoutNode>
+          <dgm:layoutNode name="spVertical2">
+            <dgm:alg type="sp"/>
+            <dgm:shape xmlns:r="http://schemas.openxmlformats.org/officeDocument/2006/relationships" r:blip="">
+              <dgm:adjLst/>
+            </dgm:shape>
+            <dgm:presOf/>
+            <dgm:constrLst/>
+            <dgm:ruleLst/>
+          </dgm:layoutNode>
+          <dgm:layoutNode name="spVertical3">
+            <dgm:alg type="sp"/>
+            <dgm:shape xmlns:r="http://schemas.openxmlformats.org/officeDocument/2006/relationships" r:blip="">
+              <dgm:adjLst/>
+            </dgm:shape>
+            <dgm:presOf/>
+            <dgm:constrLst/>
+            <dgm:ruleLst/>
+          </dgm:layoutNode>
+          <dgm:choose name="Name11">
+            <dgm:if name="Name12" axis="ch" ptType="node" func="cnt" op="gte" val="1">
+              <dgm:layoutNode name="desTx" styleLbl="revTx">
+                <dgm:varLst>
+                  <dgm:bulletEnabled val="1"/>
+                </dgm:varLst>
+                <dgm:alg type="tx">
+                  <dgm:param type="stBulletLvl" val="1"/>
+                </dgm:alg>
+                <dgm:shape xmlns:r="http://schemas.openxmlformats.org/officeDocument/2006/relationships" type="rect" r:blip="">
+                  <dgm:adjLst/>
+                </dgm:shape>
+                <dgm:presOf axis="des" ptType="node"/>
+                <dgm:constrLst>
+                  <dgm:constr type="tMarg"/>
+                  <dgm:constr type="bMarg"/>
+                  <dgm:constr type="rMarg"/>
+                  <dgm:constr type="lMarg"/>
+                </dgm:constrLst>
+                <dgm:ruleLst>
+                  <dgm:rule type="h" val="INF" fact="NaN" max="NaN"/>
+                </dgm:ruleLst>
+              </dgm:layoutNode>
+            </dgm:if>
+            <dgm:else name="Name13"/>
+          </dgm:choose>
+        </dgm:layoutNode>
+        <dgm:forEach name="Name14" axis="followSib" ptType="sibTrans" cnt="1">
+          <dgm:layoutNode name="space">
+            <dgm:alg type="sp"/>
+            <dgm:shape xmlns:r="http://schemas.openxmlformats.org/officeDocument/2006/relationships" r:blip="">
+              <dgm:adjLst/>
+            </dgm:shape>
+            <dgm:presOf/>
+            <dgm:constrLst/>
+            <dgm:ruleLst/>
+          </dgm:layoutNode>
+        </dgm:forEach>
+      </dgm:forEach>
+      <dgm:layoutNode name="padding2">
+        <dgm:alg type="sp"/>
+        <dgm:shape xmlns:r="http://schemas.openxmlformats.org/officeDocument/2006/relationships" r:blip="">
+          <dgm:adjLst/>
+        </dgm:shape>
+        <dgm:presOf/>
+        <dgm:constrLst/>
+        <dgm:ruleLst/>
+      </dgm:layoutNode>
+      <dgm:layoutNode name="negArrow">
+        <dgm:alg type="sp"/>
+        <dgm:shape xmlns:r="http://schemas.openxmlformats.org/officeDocument/2006/relationships" r:blip="">
+          <dgm:adjLst/>
+        </dgm:shape>
+        <dgm:presOf/>
+        <dgm:constrLst/>
+        <dgm:ruleLst/>
+      </dgm:layoutNode>
+      <dgm:layoutNode name="backgroundArrow" styleLbl="node1">
+        <dgm:alg type="sp"/>
+        <dgm:choose name="Name15">
+          <dgm:if name="Name16" func="var" arg="dir" op="equ" val="norm">
+            <dgm:shape xmlns:r="http://schemas.openxmlformats.org/officeDocument/2006/relationships" type="rightArrow" r:blip="">
+              <dgm:adjLst/>
+            </dgm:shape>
+          </dgm:if>
+          <dgm:else name="Name17">
+            <dgm:shape xmlns:r="http://schemas.openxmlformats.org/officeDocument/2006/relationships" type="leftArrow" r:blip="">
+              <dgm:adjLst/>
+            </dgm:shape>
+          </dgm:else>
+        </dgm:choose>
+        <dgm:presOf/>
+        <dgm:constrLst/>
+        <dgm:ruleLst/>
+      </dgm:layoutNode>
+    </dgm:layoutNode>
+  </dgm:layoutNode>
+</dgm:layoutDef>
+</file>
+
 <file path=ppt/diagrams/quickStyle1.xml><?xml version="1.0" encoding="utf-8"?>
 <dgm:styleDef xmlns:dgm="http://schemas.openxmlformats.org/drawingml/2006/diagram" xmlns:a="http://schemas.openxmlformats.org/drawingml/2006/main" uniqueId="urn:microsoft.com/office/officeart/2005/8/quickstyle/simple1">
   <dgm:title val=""/>
@@ -7355,6 +8685,1040 @@
         <a:scrgbClr r="0" g="0" b="0"/>
       </a:fillRef>
       <a:effectRef idx="0">
+        <a:scrgbClr r="0" g="0" b="0"/>
+      </a:effectRef>
+      <a:fontRef idx="minor"/>
+    </dgm:style>
+  </dgm:styleLbl>
+  <dgm:styleLbl name="revTx">
+    <dgm:scene3d>
+      <a:camera prst="orthographicFront"/>
+      <a:lightRig rig="threePt" dir="t"/>
+    </dgm:scene3d>
+    <dgm:sp3d/>
+    <dgm:txPr/>
+    <dgm:style>
+      <a:lnRef idx="0">
+        <a:scrgbClr r="0" g="0" b="0"/>
+      </a:lnRef>
+      <a:fillRef idx="0">
+        <a:scrgbClr r="0" g="0" b="0"/>
+      </a:fillRef>
+      <a:effectRef idx="0">
+        <a:scrgbClr r="0" g="0" b="0"/>
+      </a:effectRef>
+      <a:fontRef idx="minor"/>
+    </dgm:style>
+  </dgm:styleLbl>
+</dgm:styleDef>
+</file>
+
+<file path=ppt/diagrams/quickStyle3.xml><?xml version="1.0" encoding="utf-8"?>
+<dgm:styleDef xmlns:dgm="http://schemas.openxmlformats.org/drawingml/2006/diagram" xmlns:a="http://schemas.openxmlformats.org/drawingml/2006/main" uniqueId="urn:microsoft.com/office/officeart/2005/8/quickstyle/simple4">
+  <dgm:title val=""/>
+  <dgm:desc val=""/>
+  <dgm:catLst>
+    <dgm:cat type="simple" pri="10400"/>
+  </dgm:catLst>
+  <dgm:scene3d>
+    <a:camera prst="orthographicFront"/>
+    <a:lightRig rig="threePt" dir="t"/>
+  </dgm:scene3d>
+  <dgm:styleLbl name="node0">
+    <dgm:scene3d>
+      <a:camera prst="orthographicFront"/>
+      <a:lightRig rig="threePt" dir="t"/>
+    </dgm:scene3d>
+    <dgm:sp3d/>
+    <dgm:txPr/>
+    <dgm:style>
+      <a:lnRef idx="0">
+        <a:scrgbClr r="0" g="0" b="0"/>
+      </a:lnRef>
+      <a:fillRef idx="3">
+        <a:scrgbClr r="0" g="0" b="0"/>
+      </a:fillRef>
+      <a:effectRef idx="2">
+        <a:scrgbClr r="0" g="0" b="0"/>
+      </a:effectRef>
+      <a:fontRef idx="minor">
+        <a:schemeClr val="lt1"/>
+      </a:fontRef>
+    </dgm:style>
+  </dgm:styleLbl>
+  <dgm:styleLbl name="lnNode1">
+    <dgm:scene3d>
+      <a:camera prst="orthographicFront"/>
+      <a:lightRig rig="threePt" dir="t"/>
+    </dgm:scene3d>
+    <dgm:sp3d/>
+    <dgm:txPr/>
+    <dgm:style>
+      <a:lnRef idx="1">
+        <a:scrgbClr r="0" g="0" b="0"/>
+      </a:lnRef>
+      <a:fillRef idx="3">
+        <a:scrgbClr r="0" g="0" b="0"/>
+      </a:fillRef>
+      <a:effectRef idx="2">
+        <a:scrgbClr r="0" g="0" b="0"/>
+      </a:effectRef>
+      <a:fontRef idx="minor">
+        <a:schemeClr val="lt1"/>
+      </a:fontRef>
+    </dgm:style>
+  </dgm:styleLbl>
+  <dgm:styleLbl name="vennNode1">
+    <dgm:scene3d>
+      <a:camera prst="orthographicFront"/>
+      <a:lightRig rig="threePt" dir="t"/>
+    </dgm:scene3d>
+    <dgm:sp3d/>
+    <dgm:txPr/>
+    <dgm:style>
+      <a:lnRef idx="0">
+        <a:scrgbClr r="0" g="0" b="0"/>
+      </a:lnRef>
+      <a:fillRef idx="3">
+        <a:scrgbClr r="0" g="0" b="0"/>
+      </a:fillRef>
+      <a:effectRef idx="0">
+        <a:scrgbClr r="0" g="0" b="0"/>
+      </a:effectRef>
+      <a:fontRef idx="minor">
+        <a:schemeClr val="tx1"/>
+      </a:fontRef>
+    </dgm:style>
+  </dgm:styleLbl>
+  <dgm:styleLbl name="alignNode1">
+    <dgm:scene3d>
+      <a:camera prst="orthographicFront"/>
+      <a:lightRig rig="threePt" dir="t"/>
+    </dgm:scene3d>
+    <dgm:sp3d/>
+    <dgm:txPr/>
+    <dgm:style>
+      <a:lnRef idx="1">
+        <a:scrgbClr r="0" g="0" b="0"/>
+      </a:lnRef>
+      <a:fillRef idx="3">
+        <a:scrgbClr r="0" g="0" b="0"/>
+      </a:fillRef>
+      <a:effectRef idx="2">
+        <a:scrgbClr r="0" g="0" b="0"/>
+      </a:effectRef>
+      <a:fontRef idx="minor">
+        <a:schemeClr val="lt1"/>
+      </a:fontRef>
+    </dgm:style>
+  </dgm:styleLbl>
+  <dgm:styleLbl name="node1">
+    <dgm:scene3d>
+      <a:camera prst="orthographicFront"/>
+      <a:lightRig rig="threePt" dir="t"/>
+    </dgm:scene3d>
+    <dgm:sp3d/>
+    <dgm:txPr/>
+    <dgm:style>
+      <a:lnRef idx="0">
+        <a:scrgbClr r="0" g="0" b="0"/>
+      </a:lnRef>
+      <a:fillRef idx="3">
+        <a:scrgbClr r="0" g="0" b="0"/>
+      </a:fillRef>
+      <a:effectRef idx="2">
+        <a:scrgbClr r="0" g="0" b="0"/>
+      </a:effectRef>
+      <a:fontRef idx="minor">
+        <a:schemeClr val="lt1"/>
+      </a:fontRef>
+    </dgm:style>
+  </dgm:styleLbl>
+  <dgm:styleLbl name="node2">
+    <dgm:scene3d>
+      <a:camera prst="orthographicFront"/>
+      <a:lightRig rig="threePt" dir="t"/>
+    </dgm:scene3d>
+    <dgm:sp3d/>
+    <dgm:txPr/>
+    <dgm:style>
+      <a:lnRef idx="0">
+        <a:scrgbClr r="0" g="0" b="0"/>
+      </a:lnRef>
+      <a:fillRef idx="3">
+        <a:scrgbClr r="0" g="0" b="0"/>
+      </a:fillRef>
+      <a:effectRef idx="2">
+        <a:scrgbClr r="0" g="0" b="0"/>
+      </a:effectRef>
+      <a:fontRef idx="minor">
+        <a:schemeClr val="lt1"/>
+      </a:fontRef>
+    </dgm:style>
+  </dgm:styleLbl>
+  <dgm:styleLbl name="node3">
+    <dgm:scene3d>
+      <a:camera prst="orthographicFront"/>
+      <a:lightRig rig="threePt" dir="t"/>
+    </dgm:scene3d>
+    <dgm:sp3d/>
+    <dgm:txPr/>
+    <dgm:style>
+      <a:lnRef idx="0">
+        <a:scrgbClr r="0" g="0" b="0"/>
+      </a:lnRef>
+      <a:fillRef idx="3">
+        <a:scrgbClr r="0" g="0" b="0"/>
+      </a:fillRef>
+      <a:effectRef idx="2">
+        <a:scrgbClr r="0" g="0" b="0"/>
+      </a:effectRef>
+      <a:fontRef idx="minor">
+        <a:schemeClr val="lt1"/>
+      </a:fontRef>
+    </dgm:style>
+  </dgm:styleLbl>
+  <dgm:styleLbl name="node4">
+    <dgm:scene3d>
+      <a:camera prst="orthographicFront"/>
+      <a:lightRig rig="threePt" dir="t"/>
+    </dgm:scene3d>
+    <dgm:sp3d/>
+    <dgm:txPr/>
+    <dgm:style>
+      <a:lnRef idx="0">
+        <a:scrgbClr r="0" g="0" b="0"/>
+      </a:lnRef>
+      <a:fillRef idx="3">
+        <a:scrgbClr r="0" g="0" b="0"/>
+      </a:fillRef>
+      <a:effectRef idx="2">
+        <a:scrgbClr r="0" g="0" b="0"/>
+      </a:effectRef>
+      <a:fontRef idx="minor">
+        <a:schemeClr val="lt1"/>
+      </a:fontRef>
+    </dgm:style>
+  </dgm:styleLbl>
+  <dgm:styleLbl name="fgImgPlace1">
+    <dgm:scene3d>
+      <a:camera prst="orthographicFront"/>
+      <a:lightRig rig="threePt" dir="t"/>
+    </dgm:scene3d>
+    <dgm:sp3d/>
+    <dgm:txPr/>
+    <dgm:style>
+      <a:lnRef idx="0">
+        <a:scrgbClr r="0" g="0" b="0"/>
+      </a:lnRef>
+      <a:fillRef idx="1">
+        <a:scrgbClr r="0" g="0" b="0"/>
+      </a:fillRef>
+      <a:effectRef idx="2">
+        <a:scrgbClr r="0" g="0" b="0"/>
+      </a:effectRef>
+      <a:fontRef idx="minor"/>
+    </dgm:style>
+  </dgm:styleLbl>
+  <dgm:styleLbl name="alignImgPlace1">
+    <dgm:scene3d>
+      <a:camera prst="orthographicFront"/>
+      <a:lightRig rig="threePt" dir="t"/>
+    </dgm:scene3d>
+    <dgm:sp3d/>
+    <dgm:txPr/>
+    <dgm:style>
+      <a:lnRef idx="0">
+        <a:scrgbClr r="0" g="0" b="0"/>
+      </a:lnRef>
+      <a:fillRef idx="1">
+        <a:scrgbClr r="0" g="0" b="0"/>
+      </a:fillRef>
+      <a:effectRef idx="2">
+        <a:scrgbClr r="0" g="0" b="0"/>
+      </a:effectRef>
+      <a:fontRef idx="minor"/>
+    </dgm:style>
+  </dgm:styleLbl>
+  <dgm:styleLbl name="bgImgPlace1">
+    <dgm:scene3d>
+      <a:camera prst="orthographicFront"/>
+      <a:lightRig rig="threePt" dir="t"/>
+    </dgm:scene3d>
+    <dgm:sp3d/>
+    <dgm:txPr/>
+    <dgm:style>
+      <a:lnRef idx="0">
+        <a:scrgbClr r="0" g="0" b="0"/>
+      </a:lnRef>
+      <a:fillRef idx="1">
+        <a:scrgbClr r="0" g="0" b="0"/>
+      </a:fillRef>
+      <a:effectRef idx="2">
+        <a:scrgbClr r="0" g="0" b="0"/>
+      </a:effectRef>
+      <a:fontRef idx="minor"/>
+    </dgm:style>
+  </dgm:styleLbl>
+  <dgm:styleLbl name="sibTrans2D1">
+    <dgm:scene3d>
+      <a:camera prst="orthographicFront"/>
+      <a:lightRig rig="threePt" dir="t"/>
+    </dgm:scene3d>
+    <dgm:sp3d/>
+    <dgm:txPr/>
+    <dgm:style>
+      <a:lnRef idx="0">
+        <a:scrgbClr r="0" g="0" b="0"/>
+      </a:lnRef>
+      <a:fillRef idx="3">
+        <a:scrgbClr r="0" g="0" b="0"/>
+      </a:fillRef>
+      <a:effectRef idx="2">
+        <a:scrgbClr r="0" g="0" b="0"/>
+      </a:effectRef>
+      <a:fontRef idx="minor">
+        <a:schemeClr val="lt1"/>
+      </a:fontRef>
+    </dgm:style>
+  </dgm:styleLbl>
+  <dgm:styleLbl name="fgSibTrans2D1">
+    <dgm:scene3d>
+      <a:camera prst="orthographicFront"/>
+      <a:lightRig rig="threePt" dir="t"/>
+    </dgm:scene3d>
+    <dgm:sp3d/>
+    <dgm:txPr/>
+    <dgm:style>
+      <a:lnRef idx="0">
+        <a:scrgbClr r="0" g="0" b="0"/>
+      </a:lnRef>
+      <a:fillRef idx="3">
+        <a:scrgbClr r="0" g="0" b="0"/>
+      </a:fillRef>
+      <a:effectRef idx="2">
+        <a:scrgbClr r="0" g="0" b="0"/>
+      </a:effectRef>
+      <a:fontRef idx="minor">
+        <a:schemeClr val="lt1"/>
+      </a:fontRef>
+    </dgm:style>
+  </dgm:styleLbl>
+  <dgm:styleLbl name="bgSibTrans2D1">
+    <dgm:scene3d>
+      <a:camera prst="orthographicFront"/>
+      <a:lightRig rig="threePt" dir="t"/>
+    </dgm:scene3d>
+    <dgm:sp3d/>
+    <dgm:txPr/>
+    <dgm:style>
+      <a:lnRef idx="0">
+        <a:scrgbClr r="0" g="0" b="0"/>
+      </a:lnRef>
+      <a:fillRef idx="3">
+        <a:scrgbClr r="0" g="0" b="0"/>
+      </a:fillRef>
+      <a:effectRef idx="2">
+        <a:scrgbClr r="0" g="0" b="0"/>
+      </a:effectRef>
+      <a:fontRef idx="minor">
+        <a:schemeClr val="lt1"/>
+      </a:fontRef>
+    </dgm:style>
+  </dgm:styleLbl>
+  <dgm:styleLbl name="sibTrans1D1">
+    <dgm:scene3d>
+      <a:camera prst="orthographicFront"/>
+      <a:lightRig rig="threePt" dir="t"/>
+    </dgm:scene3d>
+    <dgm:sp3d/>
+    <dgm:txPr/>
+    <dgm:style>
+      <a:lnRef idx="1">
+        <a:scrgbClr r="0" g="0" b="0"/>
+      </a:lnRef>
+      <a:fillRef idx="0">
+        <a:scrgbClr r="0" g="0" b="0"/>
+      </a:fillRef>
+      <a:effectRef idx="0">
+        <a:scrgbClr r="0" g="0" b="0"/>
+      </a:effectRef>
+      <a:fontRef idx="minor"/>
+    </dgm:style>
+  </dgm:styleLbl>
+  <dgm:styleLbl name="callout">
+    <dgm:scene3d>
+      <a:camera prst="orthographicFront"/>
+      <a:lightRig rig="threePt" dir="t"/>
+    </dgm:scene3d>
+    <dgm:sp3d/>
+    <dgm:txPr/>
+    <dgm:style>
+      <a:lnRef idx="2">
+        <a:scrgbClr r="0" g="0" b="0"/>
+      </a:lnRef>
+      <a:fillRef idx="1">
+        <a:scrgbClr r="0" g="0" b="0"/>
+      </a:fillRef>
+      <a:effectRef idx="1">
+        <a:scrgbClr r="0" g="0" b="0"/>
+      </a:effectRef>
+      <a:fontRef idx="minor"/>
+    </dgm:style>
+  </dgm:styleLbl>
+  <dgm:styleLbl name="asst0">
+    <dgm:scene3d>
+      <a:camera prst="orthographicFront"/>
+      <a:lightRig rig="threePt" dir="t"/>
+    </dgm:scene3d>
+    <dgm:sp3d/>
+    <dgm:txPr/>
+    <dgm:style>
+      <a:lnRef idx="0">
+        <a:scrgbClr r="0" g="0" b="0"/>
+      </a:lnRef>
+      <a:fillRef idx="3">
+        <a:scrgbClr r="0" g="0" b="0"/>
+      </a:fillRef>
+      <a:effectRef idx="2">
+        <a:scrgbClr r="0" g="0" b="0"/>
+      </a:effectRef>
+      <a:fontRef idx="minor">
+        <a:schemeClr val="lt1"/>
+      </a:fontRef>
+    </dgm:style>
+  </dgm:styleLbl>
+  <dgm:styleLbl name="asst1">
+    <dgm:scene3d>
+      <a:camera prst="orthographicFront"/>
+      <a:lightRig rig="threePt" dir="t"/>
+    </dgm:scene3d>
+    <dgm:sp3d/>
+    <dgm:txPr/>
+    <dgm:style>
+      <a:lnRef idx="0">
+        <a:scrgbClr r="0" g="0" b="0"/>
+      </a:lnRef>
+      <a:fillRef idx="3">
+        <a:scrgbClr r="0" g="0" b="0"/>
+      </a:fillRef>
+      <a:effectRef idx="2">
+        <a:scrgbClr r="0" g="0" b="0"/>
+      </a:effectRef>
+      <a:fontRef idx="minor">
+        <a:schemeClr val="lt1"/>
+      </a:fontRef>
+    </dgm:style>
+  </dgm:styleLbl>
+  <dgm:styleLbl name="asst2">
+    <dgm:scene3d>
+      <a:camera prst="orthographicFront"/>
+      <a:lightRig rig="threePt" dir="t"/>
+    </dgm:scene3d>
+    <dgm:sp3d/>
+    <dgm:txPr/>
+    <dgm:style>
+      <a:lnRef idx="0">
+        <a:scrgbClr r="0" g="0" b="0"/>
+      </a:lnRef>
+      <a:fillRef idx="3">
+        <a:scrgbClr r="0" g="0" b="0"/>
+      </a:fillRef>
+      <a:effectRef idx="2">
+        <a:scrgbClr r="0" g="0" b="0"/>
+      </a:effectRef>
+      <a:fontRef idx="minor">
+        <a:schemeClr val="lt1"/>
+      </a:fontRef>
+    </dgm:style>
+  </dgm:styleLbl>
+  <dgm:styleLbl name="asst3">
+    <dgm:scene3d>
+      <a:camera prst="orthographicFront"/>
+      <a:lightRig rig="threePt" dir="t"/>
+    </dgm:scene3d>
+    <dgm:sp3d/>
+    <dgm:txPr/>
+    <dgm:style>
+      <a:lnRef idx="0">
+        <a:scrgbClr r="0" g="0" b="0"/>
+      </a:lnRef>
+      <a:fillRef idx="3">
+        <a:scrgbClr r="0" g="0" b="0"/>
+      </a:fillRef>
+      <a:effectRef idx="2">
+        <a:scrgbClr r="0" g="0" b="0"/>
+      </a:effectRef>
+      <a:fontRef idx="minor">
+        <a:schemeClr val="lt1"/>
+      </a:fontRef>
+    </dgm:style>
+  </dgm:styleLbl>
+  <dgm:styleLbl name="asst4">
+    <dgm:scene3d>
+      <a:camera prst="orthographicFront"/>
+      <a:lightRig rig="threePt" dir="t"/>
+    </dgm:scene3d>
+    <dgm:sp3d/>
+    <dgm:txPr/>
+    <dgm:style>
+      <a:lnRef idx="0">
+        <a:scrgbClr r="0" g="0" b="0"/>
+      </a:lnRef>
+      <a:fillRef idx="3">
+        <a:scrgbClr r="0" g="0" b="0"/>
+      </a:fillRef>
+      <a:effectRef idx="2">
+        <a:scrgbClr r="0" g="0" b="0"/>
+      </a:effectRef>
+      <a:fontRef idx="minor">
+        <a:schemeClr val="lt1"/>
+      </a:fontRef>
+    </dgm:style>
+  </dgm:styleLbl>
+  <dgm:styleLbl name="parChTrans2D1">
+    <dgm:scene3d>
+      <a:camera prst="orthographicFront"/>
+      <a:lightRig rig="threePt" dir="t"/>
+    </dgm:scene3d>
+    <dgm:sp3d/>
+    <dgm:txPr/>
+    <dgm:style>
+      <a:lnRef idx="0">
+        <a:scrgbClr r="0" g="0" b="0"/>
+      </a:lnRef>
+      <a:fillRef idx="3">
+        <a:scrgbClr r="0" g="0" b="0"/>
+      </a:fillRef>
+      <a:effectRef idx="2">
+        <a:scrgbClr r="0" g="0" b="0"/>
+      </a:effectRef>
+      <a:fontRef idx="minor">
+        <a:schemeClr val="lt1"/>
+      </a:fontRef>
+    </dgm:style>
+  </dgm:styleLbl>
+  <dgm:styleLbl name="parChTrans2D2">
+    <dgm:scene3d>
+      <a:camera prst="orthographicFront"/>
+      <a:lightRig rig="threePt" dir="t"/>
+    </dgm:scene3d>
+    <dgm:sp3d/>
+    <dgm:txPr/>
+    <dgm:style>
+      <a:lnRef idx="0">
+        <a:scrgbClr r="0" g="0" b="0"/>
+      </a:lnRef>
+      <a:fillRef idx="3">
+        <a:scrgbClr r="0" g="0" b="0"/>
+      </a:fillRef>
+      <a:effectRef idx="2">
+        <a:scrgbClr r="0" g="0" b="0"/>
+      </a:effectRef>
+      <a:fontRef idx="minor">
+        <a:schemeClr val="lt1"/>
+      </a:fontRef>
+    </dgm:style>
+  </dgm:styleLbl>
+  <dgm:styleLbl name="parChTrans2D3">
+    <dgm:scene3d>
+      <a:camera prst="orthographicFront"/>
+      <a:lightRig rig="threePt" dir="t"/>
+    </dgm:scene3d>
+    <dgm:sp3d/>
+    <dgm:txPr/>
+    <dgm:style>
+      <a:lnRef idx="1">
+        <a:scrgbClr r="0" g="0" b="0"/>
+      </a:lnRef>
+      <a:fillRef idx="3">
+        <a:scrgbClr r="0" g="0" b="0"/>
+      </a:fillRef>
+      <a:effectRef idx="2">
+        <a:scrgbClr r="0" g="0" b="0"/>
+      </a:effectRef>
+      <a:fontRef idx="minor">
+        <a:schemeClr val="lt1"/>
+      </a:fontRef>
+    </dgm:style>
+  </dgm:styleLbl>
+  <dgm:styleLbl name="parChTrans2D4">
+    <dgm:scene3d>
+      <a:camera prst="orthographicFront"/>
+      <a:lightRig rig="threePt" dir="t"/>
+    </dgm:scene3d>
+    <dgm:sp3d/>
+    <dgm:txPr/>
+    <dgm:style>
+      <a:lnRef idx="1">
+        <a:scrgbClr r="0" g="0" b="0"/>
+      </a:lnRef>
+      <a:fillRef idx="3">
+        <a:scrgbClr r="0" g="0" b="0"/>
+      </a:fillRef>
+      <a:effectRef idx="2">
+        <a:scrgbClr r="0" g="0" b="0"/>
+      </a:effectRef>
+      <a:fontRef idx="minor">
+        <a:schemeClr val="lt1"/>
+      </a:fontRef>
+    </dgm:style>
+  </dgm:styleLbl>
+  <dgm:styleLbl name="parChTrans1D1">
+    <dgm:scene3d>
+      <a:camera prst="orthographicFront"/>
+      <a:lightRig rig="threePt" dir="t"/>
+    </dgm:scene3d>
+    <dgm:sp3d/>
+    <dgm:txPr/>
+    <dgm:style>
+      <a:lnRef idx="1">
+        <a:scrgbClr r="0" g="0" b="0"/>
+      </a:lnRef>
+      <a:fillRef idx="0">
+        <a:scrgbClr r="0" g="0" b="0"/>
+      </a:fillRef>
+      <a:effectRef idx="0">
+        <a:scrgbClr r="0" g="0" b="0"/>
+      </a:effectRef>
+      <a:fontRef idx="minor"/>
+    </dgm:style>
+  </dgm:styleLbl>
+  <dgm:styleLbl name="parChTrans1D2">
+    <dgm:scene3d>
+      <a:camera prst="orthographicFront"/>
+      <a:lightRig rig="threePt" dir="t"/>
+    </dgm:scene3d>
+    <dgm:sp3d/>
+    <dgm:txPr/>
+    <dgm:style>
+      <a:lnRef idx="1">
+        <a:scrgbClr r="0" g="0" b="0"/>
+      </a:lnRef>
+      <a:fillRef idx="0">
+        <a:scrgbClr r="0" g="0" b="0"/>
+      </a:fillRef>
+      <a:effectRef idx="0">
+        <a:scrgbClr r="0" g="0" b="0"/>
+      </a:effectRef>
+      <a:fontRef idx="minor"/>
+    </dgm:style>
+  </dgm:styleLbl>
+  <dgm:styleLbl name="parChTrans1D3">
+    <dgm:scene3d>
+      <a:camera prst="orthographicFront"/>
+      <a:lightRig rig="threePt" dir="t"/>
+    </dgm:scene3d>
+    <dgm:sp3d/>
+    <dgm:txPr/>
+    <dgm:style>
+      <a:lnRef idx="1">
+        <a:scrgbClr r="0" g="0" b="0"/>
+      </a:lnRef>
+      <a:fillRef idx="0">
+        <a:scrgbClr r="0" g="0" b="0"/>
+      </a:fillRef>
+      <a:effectRef idx="0">
+        <a:scrgbClr r="0" g="0" b="0"/>
+      </a:effectRef>
+      <a:fontRef idx="minor"/>
+    </dgm:style>
+  </dgm:styleLbl>
+  <dgm:styleLbl name="parChTrans1D4">
+    <dgm:scene3d>
+      <a:camera prst="orthographicFront"/>
+      <a:lightRig rig="threePt" dir="t"/>
+    </dgm:scene3d>
+    <dgm:sp3d/>
+    <dgm:txPr/>
+    <dgm:style>
+      <a:lnRef idx="1">
+        <a:scrgbClr r="0" g="0" b="0"/>
+      </a:lnRef>
+      <a:fillRef idx="0">
+        <a:scrgbClr r="0" g="0" b="0"/>
+      </a:fillRef>
+      <a:effectRef idx="0">
+        <a:scrgbClr r="0" g="0" b="0"/>
+      </a:effectRef>
+      <a:fontRef idx="minor"/>
+    </dgm:style>
+  </dgm:styleLbl>
+  <dgm:styleLbl name="fgAcc1">
+    <dgm:scene3d>
+      <a:camera prst="orthographicFront"/>
+      <a:lightRig rig="threePt" dir="t"/>
+    </dgm:scene3d>
+    <dgm:sp3d/>
+    <dgm:txPr/>
+    <dgm:style>
+      <a:lnRef idx="1">
+        <a:scrgbClr r="0" g="0" b="0"/>
+      </a:lnRef>
+      <a:fillRef idx="1">
+        <a:scrgbClr r="0" g="0" b="0"/>
+      </a:fillRef>
+      <a:effectRef idx="0">
+        <a:scrgbClr r="0" g="0" b="0"/>
+      </a:effectRef>
+      <a:fontRef idx="minor"/>
+    </dgm:style>
+  </dgm:styleLbl>
+  <dgm:styleLbl name="conFgAcc1">
+    <dgm:scene3d>
+      <a:camera prst="orthographicFront"/>
+      <a:lightRig rig="threePt" dir="t"/>
+    </dgm:scene3d>
+    <dgm:sp3d/>
+    <dgm:txPr/>
+    <dgm:style>
+      <a:lnRef idx="1">
+        <a:scrgbClr r="0" g="0" b="0"/>
+      </a:lnRef>
+      <a:fillRef idx="1">
+        <a:scrgbClr r="0" g="0" b="0"/>
+      </a:fillRef>
+      <a:effectRef idx="0">
+        <a:scrgbClr r="0" g="0" b="0"/>
+      </a:effectRef>
+      <a:fontRef idx="minor"/>
+    </dgm:style>
+  </dgm:styleLbl>
+  <dgm:styleLbl name="alignAcc1">
+    <dgm:scene3d>
+      <a:camera prst="orthographicFront"/>
+      <a:lightRig rig="threePt" dir="t"/>
+    </dgm:scene3d>
+    <dgm:sp3d/>
+    <dgm:txPr/>
+    <dgm:style>
+      <a:lnRef idx="1">
+        <a:scrgbClr r="0" g="0" b="0"/>
+      </a:lnRef>
+      <a:fillRef idx="1">
+        <a:scrgbClr r="0" g="0" b="0"/>
+      </a:fillRef>
+      <a:effectRef idx="0">
+        <a:scrgbClr r="0" g="0" b="0"/>
+      </a:effectRef>
+      <a:fontRef idx="minor"/>
+    </dgm:style>
+  </dgm:styleLbl>
+  <dgm:styleLbl name="trAlignAcc1">
+    <dgm:scene3d>
+      <a:camera prst="orthographicFront"/>
+      <a:lightRig rig="threePt" dir="t"/>
+    </dgm:scene3d>
+    <dgm:sp3d/>
+    <dgm:txPr/>
+    <dgm:style>
+      <a:lnRef idx="1">
+        <a:scrgbClr r="0" g="0" b="0"/>
+      </a:lnRef>
+      <a:fillRef idx="1">
+        <a:scrgbClr r="0" g="0" b="0"/>
+      </a:fillRef>
+      <a:effectRef idx="0">
+        <a:scrgbClr r="0" g="0" b="0"/>
+      </a:effectRef>
+      <a:fontRef idx="minor"/>
+    </dgm:style>
+  </dgm:styleLbl>
+  <dgm:styleLbl name="bgAcc1">
+    <dgm:scene3d>
+      <a:camera prst="orthographicFront"/>
+      <a:lightRig rig="threePt" dir="t"/>
+    </dgm:scene3d>
+    <dgm:sp3d/>
+    <dgm:txPr/>
+    <dgm:style>
+      <a:lnRef idx="1">
+        <a:scrgbClr r="0" g="0" b="0"/>
+      </a:lnRef>
+      <a:fillRef idx="1">
+        <a:scrgbClr r="0" g="0" b="0"/>
+      </a:fillRef>
+      <a:effectRef idx="0">
+        <a:scrgbClr r="0" g="0" b="0"/>
+      </a:effectRef>
+      <a:fontRef idx="minor"/>
+    </dgm:style>
+  </dgm:styleLbl>
+  <dgm:styleLbl name="solidFgAcc1">
+    <dgm:scene3d>
+      <a:camera prst="orthographicFront"/>
+      <a:lightRig rig="threePt" dir="t"/>
+    </dgm:scene3d>
+    <dgm:sp3d/>
+    <dgm:txPr/>
+    <dgm:style>
+      <a:lnRef idx="1">
+        <a:scrgbClr r="0" g="0" b="0"/>
+      </a:lnRef>
+      <a:fillRef idx="1">
+        <a:scrgbClr r="0" g="0" b="0"/>
+      </a:fillRef>
+      <a:effectRef idx="0">
+        <a:scrgbClr r="0" g="0" b="0"/>
+      </a:effectRef>
+      <a:fontRef idx="minor"/>
+    </dgm:style>
+  </dgm:styleLbl>
+  <dgm:styleLbl name="solidAlignAcc1">
+    <dgm:scene3d>
+      <a:camera prst="orthographicFront"/>
+      <a:lightRig rig="threePt" dir="t"/>
+    </dgm:scene3d>
+    <dgm:sp3d/>
+    <dgm:txPr/>
+    <dgm:style>
+      <a:lnRef idx="1">
+        <a:scrgbClr r="0" g="0" b="0"/>
+      </a:lnRef>
+      <a:fillRef idx="1">
+        <a:scrgbClr r="0" g="0" b="0"/>
+      </a:fillRef>
+      <a:effectRef idx="0">
+        <a:scrgbClr r="0" g="0" b="0"/>
+      </a:effectRef>
+      <a:fontRef idx="minor"/>
+    </dgm:style>
+  </dgm:styleLbl>
+  <dgm:styleLbl name="solidBgAcc1">
+    <dgm:scene3d>
+      <a:camera prst="orthographicFront"/>
+      <a:lightRig rig="threePt" dir="t"/>
+    </dgm:scene3d>
+    <dgm:sp3d/>
+    <dgm:txPr/>
+    <dgm:style>
+      <a:lnRef idx="1">
+        <a:scrgbClr r="0" g="0" b="0"/>
+      </a:lnRef>
+      <a:fillRef idx="1">
+        <a:scrgbClr r="0" g="0" b="0"/>
+      </a:fillRef>
+      <a:effectRef idx="0">
+        <a:scrgbClr r="0" g="0" b="0"/>
+      </a:effectRef>
+      <a:fontRef idx="minor"/>
+    </dgm:style>
+  </dgm:styleLbl>
+  <dgm:styleLbl name="fgAccFollowNode1">
+    <dgm:scene3d>
+      <a:camera prst="orthographicFront"/>
+      <a:lightRig rig="threePt" dir="t"/>
+    </dgm:scene3d>
+    <dgm:sp3d/>
+    <dgm:txPr/>
+    <dgm:style>
+      <a:lnRef idx="1">
+        <a:scrgbClr r="0" g="0" b="0"/>
+      </a:lnRef>
+      <a:fillRef idx="1">
+        <a:scrgbClr r="0" g="0" b="0"/>
+      </a:fillRef>
+      <a:effectRef idx="0">
+        <a:scrgbClr r="0" g="0" b="0"/>
+      </a:effectRef>
+      <a:fontRef idx="minor"/>
+    </dgm:style>
+  </dgm:styleLbl>
+  <dgm:styleLbl name="alignAccFollowNode1">
+    <dgm:scene3d>
+      <a:camera prst="orthographicFront"/>
+      <a:lightRig rig="threePt" dir="t"/>
+    </dgm:scene3d>
+    <dgm:sp3d/>
+    <dgm:txPr/>
+    <dgm:style>
+      <a:lnRef idx="1">
+        <a:scrgbClr r="0" g="0" b="0"/>
+      </a:lnRef>
+      <a:fillRef idx="1">
+        <a:scrgbClr r="0" g="0" b="0"/>
+      </a:fillRef>
+      <a:effectRef idx="0">
+        <a:scrgbClr r="0" g="0" b="0"/>
+      </a:effectRef>
+      <a:fontRef idx="minor"/>
+    </dgm:style>
+  </dgm:styleLbl>
+  <dgm:styleLbl name="bgAccFollowNode1">
+    <dgm:scene3d>
+      <a:camera prst="orthographicFront"/>
+      <a:lightRig rig="threePt" dir="t"/>
+    </dgm:scene3d>
+    <dgm:sp3d/>
+    <dgm:txPr/>
+    <dgm:style>
+      <a:lnRef idx="1">
+        <a:scrgbClr r="0" g="0" b="0"/>
+      </a:lnRef>
+      <a:fillRef idx="1">
+        <a:scrgbClr r="0" g="0" b="0"/>
+      </a:fillRef>
+      <a:effectRef idx="0">
+        <a:scrgbClr r="0" g="0" b="0"/>
+      </a:effectRef>
+      <a:fontRef idx="minor"/>
+    </dgm:style>
+  </dgm:styleLbl>
+  <dgm:styleLbl name="fgAcc0">
+    <dgm:scene3d>
+      <a:camera prst="orthographicFront"/>
+      <a:lightRig rig="threePt" dir="t"/>
+    </dgm:scene3d>
+    <dgm:sp3d/>
+    <dgm:txPr/>
+    <dgm:style>
+      <a:lnRef idx="1">
+        <a:scrgbClr r="0" g="0" b="0"/>
+      </a:lnRef>
+      <a:fillRef idx="1">
+        <a:scrgbClr r="0" g="0" b="0"/>
+      </a:fillRef>
+      <a:effectRef idx="0">
+        <a:scrgbClr r="0" g="0" b="0"/>
+      </a:effectRef>
+      <a:fontRef idx="minor"/>
+    </dgm:style>
+  </dgm:styleLbl>
+  <dgm:styleLbl name="fgAcc2">
+    <dgm:scene3d>
+      <a:camera prst="orthographicFront"/>
+      <a:lightRig rig="threePt" dir="t"/>
+    </dgm:scene3d>
+    <dgm:sp3d/>
+    <dgm:txPr/>
+    <dgm:style>
+      <a:lnRef idx="1">
+        <a:scrgbClr r="0" g="0" b="0"/>
+      </a:lnRef>
+      <a:fillRef idx="1">
+        <a:scrgbClr r="0" g="0" b="0"/>
+      </a:fillRef>
+      <a:effectRef idx="0">
+        <a:scrgbClr r="0" g="0" b="0"/>
+      </a:effectRef>
+      <a:fontRef idx="minor"/>
+    </dgm:style>
+  </dgm:styleLbl>
+  <dgm:styleLbl name="fgAcc3">
+    <dgm:scene3d>
+      <a:camera prst="orthographicFront"/>
+      <a:lightRig rig="threePt" dir="t"/>
+    </dgm:scene3d>
+    <dgm:sp3d/>
+    <dgm:txPr/>
+    <dgm:style>
+      <a:lnRef idx="1">
+        <a:scrgbClr r="0" g="0" b="0"/>
+      </a:lnRef>
+      <a:fillRef idx="1">
+        <a:scrgbClr r="0" g="0" b="0"/>
+      </a:fillRef>
+      <a:effectRef idx="0">
+        <a:scrgbClr r="0" g="0" b="0"/>
+      </a:effectRef>
+      <a:fontRef idx="minor"/>
+    </dgm:style>
+  </dgm:styleLbl>
+  <dgm:styleLbl name="fgAcc4">
+    <dgm:scene3d>
+      <a:camera prst="orthographicFront"/>
+      <a:lightRig rig="threePt" dir="t"/>
+    </dgm:scene3d>
+    <dgm:sp3d/>
+    <dgm:txPr/>
+    <dgm:style>
+      <a:lnRef idx="1">
+        <a:scrgbClr r="0" g="0" b="0"/>
+      </a:lnRef>
+      <a:fillRef idx="1">
+        <a:scrgbClr r="0" g="0" b="0"/>
+      </a:fillRef>
+      <a:effectRef idx="0">
+        <a:scrgbClr r="0" g="0" b="0"/>
+      </a:effectRef>
+      <a:fontRef idx="minor"/>
+    </dgm:style>
+  </dgm:styleLbl>
+  <dgm:styleLbl name="bgShp">
+    <dgm:scene3d>
+      <a:camera prst="orthographicFront"/>
+      <a:lightRig rig="threePt" dir="t"/>
+    </dgm:scene3d>
+    <dgm:sp3d/>
+    <dgm:txPr/>
+    <dgm:style>
+      <a:lnRef idx="0">
+        <a:scrgbClr r="0" g="0" b="0"/>
+      </a:lnRef>
+      <a:fillRef idx="1">
+        <a:scrgbClr r="0" g="0" b="0"/>
+      </a:fillRef>
+      <a:effectRef idx="2">
+        <a:scrgbClr r="0" g="0" b="0"/>
+      </a:effectRef>
+      <a:fontRef idx="minor"/>
+    </dgm:style>
+  </dgm:styleLbl>
+  <dgm:styleLbl name="dkBgShp">
+    <dgm:scene3d>
+      <a:camera prst="orthographicFront"/>
+      <a:lightRig rig="threePt" dir="t"/>
+    </dgm:scene3d>
+    <dgm:sp3d/>
+    <dgm:txPr/>
+    <dgm:style>
+      <a:lnRef idx="0">
+        <a:scrgbClr r="0" g="0" b="0"/>
+      </a:lnRef>
+      <a:fillRef idx="1">
+        <a:scrgbClr r="0" g="0" b="0"/>
+      </a:fillRef>
+      <a:effectRef idx="2">
+        <a:scrgbClr r="0" g="0" b="0"/>
+      </a:effectRef>
+      <a:fontRef idx="minor"/>
+    </dgm:style>
+  </dgm:styleLbl>
+  <dgm:styleLbl name="trBgShp">
+    <dgm:scene3d>
+      <a:camera prst="orthographicFront"/>
+      <a:lightRig rig="threePt" dir="t"/>
+    </dgm:scene3d>
+    <dgm:sp3d/>
+    <dgm:txPr/>
+    <dgm:style>
+      <a:lnRef idx="0">
+        <a:scrgbClr r="0" g="0" b="0"/>
+      </a:lnRef>
+      <a:fillRef idx="1">
+        <a:scrgbClr r="0" g="0" b="0"/>
+      </a:fillRef>
+      <a:effectRef idx="0">
+        <a:scrgbClr r="0" g="0" b="0"/>
+      </a:effectRef>
+      <a:fontRef idx="minor"/>
+    </dgm:style>
+  </dgm:styleLbl>
+  <dgm:styleLbl name="fgShp">
+    <dgm:scene3d>
+      <a:camera prst="orthographicFront"/>
+      <a:lightRig rig="threePt" dir="t"/>
+    </dgm:scene3d>
+    <dgm:sp3d/>
+    <dgm:txPr/>
+    <dgm:style>
+      <a:lnRef idx="0">
+        <a:scrgbClr r="0" g="0" b="0"/>
+      </a:lnRef>
+      <a:fillRef idx="3">
+        <a:scrgbClr r="0" g="0" b="0"/>
+      </a:fillRef>
+      <a:effectRef idx="2">
         <a:scrgbClr r="0" g="0" b="0"/>
       </a:effectRef>
       <a:fontRef idx="minor"/>
@@ -7569,7 +9933,7 @@
           <a:p>
             <a:fld id="{4CD0077A-2503-4B4E-A222-F375CCC54224}" type="datetimeFigureOut">
               <a:rPr lang="es-ES_tradnl" smtClean="0"/>
-              <a:t>28/10/18</a:t>
+              <a:t>1/12/18</a:t>
             </a:fld>
             <a:endParaRPr lang="es-ES_tradnl"/>
           </a:p>
@@ -7844,7 +10208,7 @@
           <a:p>
             <a:fld id="{4CD0077A-2503-4B4E-A222-F375CCC54224}" type="datetimeFigureOut">
               <a:rPr lang="es-ES_tradnl" smtClean="0"/>
-              <a:t>28/10/18</a:t>
+              <a:t>1/12/18</a:t>
             </a:fld>
             <a:endParaRPr lang="es-ES_tradnl"/>
           </a:p>
@@ -8038,7 +10402,7 @@
           <a:p>
             <a:fld id="{4CD0077A-2503-4B4E-A222-F375CCC54224}" type="datetimeFigureOut">
               <a:rPr lang="es-ES_tradnl" smtClean="0"/>
-              <a:t>28/10/18</a:t>
+              <a:t>1/12/18</a:t>
             </a:fld>
             <a:endParaRPr lang="es-ES_tradnl"/>
           </a:p>
@@ -8311,7 +10675,7 @@
           <a:p>
             <a:fld id="{4CD0077A-2503-4B4E-A222-F375CCC54224}" type="datetimeFigureOut">
               <a:rPr lang="es-ES_tradnl" smtClean="0"/>
-              <a:t>28/10/18</a:t>
+              <a:t>1/12/18</a:t>
             </a:fld>
             <a:endParaRPr lang="es-ES_tradnl"/>
           </a:p>
@@ -8652,7 +11016,7 @@
           <a:p>
             <a:fld id="{4CD0077A-2503-4B4E-A222-F375CCC54224}" type="datetimeFigureOut">
               <a:rPr lang="es-ES_tradnl" smtClean="0"/>
-              <a:t>28/10/18</a:t>
+              <a:t>1/12/18</a:t>
             </a:fld>
             <a:endParaRPr lang="es-ES_tradnl"/>
           </a:p>
@@ -9275,7 +11639,7 @@
           <a:p>
             <a:fld id="{4CD0077A-2503-4B4E-A222-F375CCC54224}" type="datetimeFigureOut">
               <a:rPr lang="es-ES_tradnl" smtClean="0"/>
-              <a:t>28/10/18</a:t>
+              <a:t>1/12/18</a:t>
             </a:fld>
             <a:endParaRPr lang="es-ES_tradnl"/>
           </a:p>
@@ -10135,7 +12499,7 @@
           <a:p>
             <a:fld id="{4CD0077A-2503-4B4E-A222-F375CCC54224}" type="datetimeFigureOut">
               <a:rPr lang="es-ES_tradnl" smtClean="0"/>
-              <a:t>28/10/18</a:t>
+              <a:t>1/12/18</a:t>
             </a:fld>
             <a:endParaRPr lang="es-ES_tradnl"/>
           </a:p>
@@ -10305,7 +12669,7 @@
           <a:p>
             <a:fld id="{4CD0077A-2503-4B4E-A222-F375CCC54224}" type="datetimeFigureOut">
               <a:rPr lang="es-ES_tradnl" smtClean="0"/>
-              <a:t>28/10/18</a:t>
+              <a:t>1/12/18</a:t>
             </a:fld>
             <a:endParaRPr lang="es-ES_tradnl"/>
           </a:p>
@@ -10485,7 +12849,7 @@
           <a:p>
             <a:fld id="{4CD0077A-2503-4B4E-A222-F375CCC54224}" type="datetimeFigureOut">
               <a:rPr lang="es-ES_tradnl" smtClean="0"/>
-              <a:t>28/10/18</a:t>
+              <a:t>1/12/18</a:t>
             </a:fld>
             <a:endParaRPr lang="es-ES_tradnl"/>
           </a:p>
@@ -10655,7 +13019,7 @@
           <a:p>
             <a:fld id="{4CD0077A-2503-4B4E-A222-F375CCC54224}" type="datetimeFigureOut">
               <a:rPr lang="es-ES_tradnl" smtClean="0"/>
-              <a:t>28/10/18</a:t>
+              <a:t>1/12/18</a:t>
             </a:fld>
             <a:endParaRPr lang="es-ES_tradnl"/>
           </a:p>
@@ -10902,7 +13266,7 @@
           <a:p>
             <a:fld id="{4CD0077A-2503-4B4E-A222-F375CCC54224}" type="datetimeFigureOut">
               <a:rPr lang="es-ES_tradnl" smtClean="0"/>
-              <a:t>28/10/18</a:t>
+              <a:t>1/12/18</a:t>
             </a:fld>
             <a:endParaRPr lang="es-ES_tradnl"/>
           </a:p>
@@ -11194,7 +13558,7 @@
           <a:p>
             <a:fld id="{4CD0077A-2503-4B4E-A222-F375CCC54224}" type="datetimeFigureOut">
               <a:rPr lang="es-ES_tradnl" smtClean="0"/>
-              <a:t>28/10/18</a:t>
+              <a:t>1/12/18</a:t>
             </a:fld>
             <a:endParaRPr lang="es-ES_tradnl"/>
           </a:p>
@@ -11638,7 +14002,7 @@
           <a:p>
             <a:fld id="{4CD0077A-2503-4B4E-A222-F375CCC54224}" type="datetimeFigureOut">
               <a:rPr lang="es-ES_tradnl" smtClean="0"/>
-              <a:t>28/10/18</a:t>
+              <a:t>1/12/18</a:t>
             </a:fld>
             <a:endParaRPr lang="es-ES_tradnl"/>
           </a:p>
@@ -11756,7 +14120,7 @@
           <a:p>
             <a:fld id="{4CD0077A-2503-4B4E-A222-F375CCC54224}" type="datetimeFigureOut">
               <a:rPr lang="es-ES_tradnl" smtClean="0"/>
-              <a:t>28/10/18</a:t>
+              <a:t>1/12/18</a:t>
             </a:fld>
             <a:endParaRPr lang="es-ES_tradnl"/>
           </a:p>
@@ -11851,7 +14215,7 @@
           <a:p>
             <a:fld id="{4CD0077A-2503-4B4E-A222-F375CCC54224}" type="datetimeFigureOut">
               <a:rPr lang="es-ES_tradnl" smtClean="0"/>
-              <a:t>28/10/18</a:t>
+              <a:t>1/12/18</a:t>
             </a:fld>
             <a:endParaRPr lang="es-ES_tradnl"/>
           </a:p>
@@ -12130,7 +14494,7 @@
           <a:p>
             <a:fld id="{4CD0077A-2503-4B4E-A222-F375CCC54224}" type="datetimeFigureOut">
               <a:rPr lang="es-ES_tradnl" smtClean="0"/>
-              <a:t>28/10/18</a:t>
+              <a:t>1/12/18</a:t>
             </a:fld>
             <a:endParaRPr lang="es-ES_tradnl"/>
           </a:p>
@@ -12405,7 +14769,7 @@
           <a:p>
             <a:fld id="{4CD0077A-2503-4B4E-A222-F375CCC54224}" type="datetimeFigureOut">
               <a:rPr lang="es-ES_tradnl" smtClean="0"/>
-              <a:t>28/10/18</a:t>
+              <a:t>1/12/18</a:t>
             </a:fld>
             <a:endParaRPr lang="es-ES_tradnl"/>
           </a:p>
@@ -12834,7 +15198,7 @@
           <a:p>
             <a:fld id="{4CD0077A-2503-4B4E-A222-F375CCC54224}" type="datetimeFigureOut">
               <a:rPr lang="es-ES_tradnl" smtClean="0"/>
-              <a:t>28/10/18</a:t>
+              <a:t>1/12/18</a:t>
             </a:fld>
             <a:endParaRPr lang="es-ES_tradnl"/>
           </a:p>
@@ -15228,7 +17592,7 @@
           <p:cNvPr id="2" name="Imagen 1">
             <a:extLst>
               <a:ext uri="{FF2B5EF4-FFF2-40B4-BE49-F238E27FC236}">
-                <a16:creationId xmlns:a16="http://schemas.microsoft.com/office/drawing/2014/main" xmlns="" id="{EFDA15A2-CB9F-4C2F-8478-046B9F9A294E}"/>
+                <a16:creationId xmlns="" xmlns:a16="http://schemas.microsoft.com/office/drawing/2014/main" id="{EFDA15A2-CB9F-4C2F-8478-046B9F9A294E}"/>
               </a:ext>
             </a:extLst>
           </p:cNvPr>
@@ -15899,6 +18263,59 @@
           </a:p>
         </p:txBody>
       </p:sp>
+      <p:sp>
+        <p:nvSpPr>
+          <p:cNvPr id="5" name="Google Shape;1642;p17"/>
+          <p:cNvSpPr/>
+          <p:nvPr/>
+        </p:nvSpPr>
+        <p:spPr>
+          <a:xfrm>
+            <a:off x="152401" y="152401"/>
+            <a:ext cx="12192000" cy="6858000"/>
+          </a:xfrm>
+          <a:prstGeom prst="rect">
+            <a:avLst/>
+          </a:prstGeom>
+          <a:blipFill rotWithShape="1">
+            <a:blip r:embed="rId3">
+              <a:alphaModFix amt="35000"/>
+            </a:blip>
+            <a:stretch>
+              <a:fillRect/>
+            </a:stretch>
+          </a:blipFill>
+          <a:ln>
+            <a:noFill/>
+          </a:ln>
+        </p:spPr>
+        <p:txBody>
+          <a:bodyPr spcFirstLastPara="1" wrap="square" lIns="0" tIns="0" rIns="0" bIns="0" anchor="t" anchorCtr="0">
+            <a:noAutofit/>
+          </a:bodyPr>
+          <a:lstStyle/>
+          <a:p>
+            <a:pPr marL="0" marR="0" lvl="0" indent="0" algn="l" rtl="0">
+              <a:spcBef>
+                <a:spcPts val="0"/>
+              </a:spcBef>
+              <a:spcAft>
+                <a:spcPts val="0"/>
+              </a:spcAft>
+              <a:buNone/>
+            </a:pPr>
+            <a:endParaRPr sz="1800">
+              <a:solidFill>
+                <a:schemeClr val="dk1"/>
+              </a:solidFill>
+              <a:latin typeface="Calibri"/>
+              <a:ea typeface="Calibri"/>
+              <a:cs typeface="Calibri"/>
+              <a:sym typeface="Calibri"/>
+            </a:endParaRPr>
+          </a:p>
+        </p:txBody>
+      </p:sp>
     </p:spTree>
     <p:extLst>
       <p:ext uri="{BB962C8B-B14F-4D97-AF65-F5344CB8AC3E}">
@@ -16016,28 +18433,26 @@
       </p:sp>
       <p:pic>
         <p:nvPicPr>
-          <p:cNvPr id="3" name="Imagen 2">
-            <a:extLst>
-              <a:ext uri="{FF2B5EF4-FFF2-40B4-BE49-F238E27FC236}">
-                <a16:creationId xmlns:a16="http://schemas.microsoft.com/office/drawing/2014/main" xmlns="" id="{BD598BE2-F625-4B63-AC09-E6658A210172}"/>
-              </a:ext>
-            </a:extLst>
-          </p:cNvPr>
-          <p:cNvPicPr>
-            <a:picLocks noChangeAspect="1"/>
-          </p:cNvPicPr>
+          <p:cNvPr id="5" name="Imagen 4"/>
+          <p:cNvPicPr/>
           <p:nvPr/>
         </p:nvPicPr>
         <p:blipFill>
-          <a:blip r:embed="rId3"/>
+          <a:blip r:embed="rId3">
+            <a:extLst>
+              <a:ext uri="{28A0092B-C50C-407E-A947-70E740481C1C}">
+                <a14:useLocalDpi xmlns:a14="http://schemas.microsoft.com/office/drawing/2010/main" val="0"/>
+              </a:ext>
+            </a:extLst>
+          </a:blip>
           <a:stretch>
             <a:fillRect/>
           </a:stretch>
         </p:blipFill>
         <p:spPr>
           <a:xfrm>
-            <a:off x="802091" y="1383744"/>
-            <a:ext cx="10587817" cy="5067855"/>
+            <a:off x="1014412" y="1155145"/>
+            <a:ext cx="9786109" cy="4848090"/>
           </a:xfrm>
           <a:prstGeom prst="rect">
             <a:avLst/>
@@ -16214,7 +18629,7 @@
         <p:spPr>
           <a:xfrm>
             <a:off x="814389" y="1299965"/>
-            <a:ext cx="4698515" cy="1200329"/>
+            <a:ext cx="4698515" cy="1421928"/>
           </a:xfrm>
           <a:prstGeom prst="rect">
             <a:avLst/>
@@ -16354,8 +18769,45 @@
                 <a:cs typeface="Century Gothic"/>
                 <a:sym typeface="Century Gothic"/>
               </a:rPr>
-              <a:t>Plan del alcance</a:t>
-            </a:r>
+              <a:t>Plan del </a:t>
+            </a:r>
+            <a:r>
+              <a:rPr lang="es-ES" dirty="0" smtClean="0">
+                <a:solidFill>
+                  <a:srgbClr val="2FB6BC"/>
+                </a:solidFill>
+                <a:ea typeface="Century Gothic"/>
+                <a:cs typeface="Century Gothic"/>
+                <a:sym typeface="Century Gothic"/>
+              </a:rPr>
+              <a:t>alcance</a:t>
+            </a:r>
+          </a:p>
+          <a:p>
+            <a:pPr lvl="0">
+              <a:lnSpc>
+                <a:spcPct val="80000"/>
+              </a:lnSpc>
+            </a:pPr>
+            <a:r>
+              <a:rPr lang="es-ES" dirty="0" smtClean="0">
+                <a:solidFill>
+                  <a:srgbClr val="2FB6BC"/>
+                </a:solidFill>
+                <a:ea typeface="Century Gothic"/>
+                <a:cs typeface="Century Gothic"/>
+                <a:sym typeface="Century Gothic"/>
+              </a:rPr>
+              <a:t>Cronograma</a:t>
+            </a:r>
+            <a:endParaRPr lang="es-ES" dirty="0">
+              <a:solidFill>
+                <a:srgbClr val="2FB6BC"/>
+              </a:solidFill>
+              <a:ea typeface="Century Gothic"/>
+              <a:cs typeface="Century Gothic"/>
+              <a:sym typeface="Century Gothic"/>
+            </a:endParaRPr>
           </a:p>
         </p:txBody>
       </p:sp>
@@ -16443,27 +18895,8 @@
                 <a:cs typeface="Century Gothic"/>
                 <a:sym typeface="Century Gothic"/>
               </a:rPr>
-              <a:t>Andr</a:t>
-            </a:r>
-            <a:r>
-              <a:rPr lang="es-ES" dirty="0" smtClean="0">
-                <a:solidFill>
-                  <a:schemeClr val="bg1"/>
-                </a:solidFill>
-                <a:ea typeface="Century Gothic"/>
-                <a:cs typeface="Century Gothic"/>
-                <a:sym typeface="Century Gothic"/>
-              </a:rPr>
-              <a:t>és Pejerrey</a:t>
-            </a:r>
-            <a:endParaRPr lang="es-ES" dirty="0" smtClean="0">
-              <a:solidFill>
-                <a:schemeClr val="bg1"/>
-              </a:solidFill>
-              <a:ea typeface="Century Gothic"/>
-              <a:cs typeface="Century Gothic"/>
-              <a:sym typeface="Century Gothic"/>
-            </a:endParaRPr>
+              <a:t>Andrés Pejerrey</a:t>
+            </a:r>
           </a:p>
           <a:p>
             <a:pPr lvl="0">
@@ -16511,14 +18944,6 @@
               </a:rPr>
               <a:t> Palomino</a:t>
             </a:r>
-            <a:endParaRPr lang="es-ES" dirty="0" smtClean="0">
-              <a:solidFill>
-                <a:schemeClr val="bg1"/>
-              </a:solidFill>
-              <a:ea typeface="Century Gothic"/>
-              <a:cs typeface="Century Gothic"/>
-              <a:sym typeface="Century Gothic"/>
-            </a:endParaRPr>
           </a:p>
           <a:p>
             <a:pPr lvl="0">
@@ -16604,6 +19029,789 @@
 </file>
 
 <file path=ppt/slides/slide20.xml><?xml version="1.0" encoding="utf-8"?>
+<p:sld xmlns:a="http://schemas.openxmlformats.org/drawingml/2006/main" xmlns:r="http://schemas.openxmlformats.org/officeDocument/2006/relationships" xmlns:p="http://schemas.openxmlformats.org/presentationml/2006/main">
+  <p:cSld>
+    <p:spTree>
+      <p:nvGrpSpPr>
+        <p:cNvPr id="1" name=""/>
+        <p:cNvGrpSpPr/>
+        <p:nvPr/>
+      </p:nvGrpSpPr>
+      <p:grpSpPr>
+        <a:xfrm>
+          <a:off x="0" y="0"/>
+          <a:ext cx="0" cy="0"/>
+          <a:chOff x="0" y="0"/>
+          <a:chExt cx="0" cy="0"/>
+        </a:xfrm>
+      </p:grpSpPr>
+      <p:sp>
+        <p:nvSpPr>
+          <p:cNvPr id="2" name="Título 1"/>
+          <p:cNvSpPr>
+            <a:spLocks noGrp="1"/>
+          </p:cNvSpPr>
+          <p:nvPr>
+            <p:ph type="title"/>
+          </p:nvPr>
+        </p:nvSpPr>
+        <p:spPr>
+          <a:xfrm>
+            <a:off x="646109" y="2338667"/>
+            <a:ext cx="4744037" cy="704571"/>
+          </a:xfrm>
+        </p:spPr>
+        <p:txBody>
+          <a:bodyPr/>
+          <a:lstStyle/>
+          <a:p>
+            <a:r>
+              <a:rPr lang="es-ES" dirty="0" smtClean="0"/>
+              <a:t>Cronograma</a:t>
+            </a:r>
+            <a:r>
+              <a:rPr lang="es-ES_tradnl" dirty="0"/>
+              <a:t/>
+            </a:r>
+            <a:br>
+              <a:rPr lang="es-ES_tradnl" dirty="0"/>
+            </a:br>
+            <a:endParaRPr lang="es-ES_tradnl" dirty="0"/>
+          </a:p>
+        </p:txBody>
+      </p:sp>
+      <p:pic>
+        <p:nvPicPr>
+          <p:cNvPr id="4" name="Imagen 3"/>
+          <p:cNvPicPr>
+            <a:picLocks noChangeAspect="1"/>
+          </p:cNvPicPr>
+          <p:nvPr/>
+        </p:nvPicPr>
+        <p:blipFill>
+          <a:blip r:embed="rId2">
+            <a:extLst>
+              <a:ext uri="{28A0092B-C50C-407E-A947-70E740481C1C}">
+                <a14:useLocalDpi xmlns:a14="http://schemas.microsoft.com/office/drawing/2010/main" val="0"/>
+              </a:ext>
+            </a:extLst>
+          </a:blip>
+          <a:stretch>
+            <a:fillRect/>
+          </a:stretch>
+        </p:blipFill>
+        <p:spPr>
+          <a:xfrm>
+            <a:off x="6982326" y="2454442"/>
+            <a:ext cx="3749842" cy="3749842"/>
+          </a:xfrm>
+          <a:prstGeom prst="rect">
+            <a:avLst/>
+          </a:prstGeom>
+        </p:spPr>
+      </p:pic>
+    </p:spTree>
+    <p:extLst>
+      <p:ext uri="{BB962C8B-B14F-4D97-AF65-F5344CB8AC3E}">
+        <p14:creationId xmlns:p14="http://schemas.microsoft.com/office/powerpoint/2010/main" val="29179544"/>
+      </p:ext>
+    </p:extLst>
+  </p:cSld>
+  <p:clrMapOvr>
+    <a:masterClrMapping/>
+  </p:clrMapOvr>
+  <p:timing>
+    <p:tnLst>
+      <p:par>
+        <p:cTn id="1" dur="indefinite" restart="never" nodeType="tmRoot"/>
+      </p:par>
+    </p:tnLst>
+  </p:timing>
+</p:sld>
+</file>
+
+<file path=ppt/slides/slide21.xml><?xml version="1.0" encoding="utf-8"?>
+<p:sld xmlns:a="http://schemas.openxmlformats.org/drawingml/2006/main" xmlns:r="http://schemas.openxmlformats.org/officeDocument/2006/relationships" xmlns:p="http://schemas.openxmlformats.org/presentationml/2006/main" showMasterSp="0">
+  <p:cSld>
+    <p:bg>
+      <p:bgPr>
+        <a:blipFill dpi="0" rotWithShape="1">
+          <a:blip r:embed="rId2">
+            <a:alphaModFix amt="0"/>
+            <a:duotone>
+              <a:schemeClr val="bg2">
+                <a:shade val="69000"/>
+                <a:hueMod val="108000"/>
+                <a:satMod val="164000"/>
+                <a:lumMod val="74000"/>
+              </a:schemeClr>
+              <a:schemeClr val="bg2">
+                <a:tint val="96000"/>
+                <a:hueMod val="88000"/>
+                <a:satMod val="140000"/>
+                <a:lumMod val="132000"/>
+              </a:schemeClr>
+            </a:duotone>
+            <a:lum/>
+          </a:blip>
+          <a:srcRect/>
+          <a:stretch>
+            <a:fillRect/>
+          </a:stretch>
+        </a:blipFill>
+        <a:effectLst/>
+      </p:bgPr>
+    </p:bg>
+    <p:spTree>
+      <p:nvGrpSpPr>
+        <p:cNvPr id="1" name=""/>
+        <p:cNvGrpSpPr/>
+        <p:nvPr/>
+      </p:nvGrpSpPr>
+      <p:grpSpPr>
+        <a:xfrm>
+          <a:off x="0" y="0"/>
+          <a:ext cx="0" cy="0"/>
+          <a:chOff x="0" y="0"/>
+          <a:chExt cx="0" cy="0"/>
+        </a:xfrm>
+      </p:grpSpPr>
+      <p:sp>
+        <p:nvSpPr>
+          <p:cNvPr id="4" name="CuadroTexto 3"/>
+          <p:cNvSpPr txBox="1"/>
+          <p:nvPr/>
+        </p:nvSpPr>
+        <p:spPr>
+          <a:xfrm>
+            <a:off x="1014413" y="785813"/>
+            <a:ext cx="1545616" cy="369332"/>
+          </a:xfrm>
+          <a:prstGeom prst="rect">
+            <a:avLst/>
+          </a:prstGeom>
+          <a:noFill/>
+        </p:spPr>
+        <p:txBody>
+          <a:bodyPr wrap="none" rtlCol="0">
+            <a:spAutoFit/>
+          </a:bodyPr>
+          <a:lstStyle/>
+          <a:p>
+            <a:r>
+              <a:rPr lang="es-ES" dirty="0" err="1" smtClean="0">
+                <a:solidFill>
+                  <a:schemeClr val="bg1"/>
+                </a:solidFill>
+              </a:rPr>
+              <a:t>Cronogrma</a:t>
+            </a:r>
+            <a:r>
+              <a:rPr lang="es-ES" dirty="0" smtClean="0">
+                <a:solidFill>
+                  <a:schemeClr val="bg1"/>
+                </a:solidFill>
+              </a:rPr>
+              <a:t> </a:t>
+            </a:r>
+            <a:endParaRPr lang="es-ES" dirty="0">
+              <a:solidFill>
+                <a:schemeClr val="bg1"/>
+              </a:solidFill>
+            </a:endParaRPr>
+          </a:p>
+        </p:txBody>
+      </p:sp>
+      <p:sp>
+        <p:nvSpPr>
+          <p:cNvPr id="3" name="CuadroTexto 2"/>
+          <p:cNvSpPr txBox="1"/>
+          <p:nvPr/>
+        </p:nvSpPr>
+        <p:spPr>
+          <a:xfrm>
+            <a:off x="2650989" y="2486525"/>
+            <a:ext cx="6894063" cy="1200329"/>
+          </a:xfrm>
+          <a:prstGeom prst="rect">
+            <a:avLst/>
+          </a:prstGeom>
+          <a:noFill/>
+        </p:spPr>
+        <p:txBody>
+          <a:bodyPr wrap="square" rtlCol="0">
+            <a:spAutoFit/>
+          </a:bodyPr>
+          <a:lstStyle/>
+          <a:p>
+            <a:pPr lvl="0"/>
+            <a:r>
+              <a:rPr lang="es-ES_tradnl" dirty="0" smtClean="0">
+                <a:solidFill>
+                  <a:schemeClr val="bg1">
+                    <a:lumMod val="95000"/>
+                    <a:lumOff val="5000"/>
+                  </a:schemeClr>
+                </a:solidFill>
+              </a:rPr>
+              <a:t>Cronograma:</a:t>
+            </a:r>
+            <a:endParaRPr lang="es-ES_tradnl" dirty="0">
+              <a:solidFill>
+                <a:schemeClr val="bg1">
+                  <a:lumMod val="95000"/>
+                  <a:lumOff val="5000"/>
+                </a:schemeClr>
+              </a:solidFill>
+            </a:endParaRPr>
+          </a:p>
+          <a:p>
+            <a:pPr marL="285750" lvl="0" indent="-285750">
+              <a:buFont typeface="Arial" charset="0"/>
+              <a:buChar char="•"/>
+            </a:pPr>
+            <a:r>
+              <a:rPr lang="es-ES_tradnl" dirty="0" smtClean="0">
+                <a:solidFill>
+                  <a:schemeClr val="bg1">
+                    <a:lumMod val="95000"/>
+                    <a:lumOff val="5000"/>
+                  </a:schemeClr>
+                </a:solidFill>
+              </a:rPr>
+              <a:t>Se consideran en tiempo todas las actividades que se van a realizar dentro del proyecto con su </a:t>
+            </a:r>
+            <a:r>
+              <a:rPr lang="es-ES_tradnl" dirty="0" err="1" smtClean="0">
+                <a:solidFill>
+                  <a:schemeClr val="bg1">
+                    <a:lumMod val="95000"/>
+                    <a:lumOff val="5000"/>
+                  </a:schemeClr>
+                </a:solidFill>
+              </a:rPr>
+              <a:t>entragables</a:t>
+            </a:r>
+            <a:endParaRPr lang="es-ES_tradnl" dirty="0">
+              <a:solidFill>
+                <a:schemeClr val="bg1">
+                  <a:lumMod val="95000"/>
+                  <a:lumOff val="5000"/>
+                </a:schemeClr>
+              </a:solidFill>
+            </a:endParaRPr>
+          </a:p>
+          <a:p>
+            <a:endParaRPr lang="es-ES_tradnl" dirty="0"/>
+          </a:p>
+        </p:txBody>
+      </p:sp>
+      <p:sp>
+        <p:nvSpPr>
+          <p:cNvPr id="5" name="Google Shape;1642;p17"/>
+          <p:cNvSpPr/>
+          <p:nvPr/>
+        </p:nvSpPr>
+        <p:spPr>
+          <a:xfrm>
+            <a:off x="0" y="0"/>
+            <a:ext cx="12192000" cy="6858000"/>
+          </a:xfrm>
+          <a:prstGeom prst="rect">
+            <a:avLst/>
+          </a:prstGeom>
+          <a:blipFill rotWithShape="1">
+            <a:blip r:embed="rId3">
+              <a:alphaModFix amt="35000"/>
+            </a:blip>
+            <a:stretch>
+              <a:fillRect/>
+            </a:stretch>
+          </a:blipFill>
+          <a:ln>
+            <a:noFill/>
+          </a:ln>
+        </p:spPr>
+        <p:txBody>
+          <a:bodyPr spcFirstLastPara="1" wrap="square" lIns="0" tIns="0" rIns="0" bIns="0" anchor="t" anchorCtr="0">
+            <a:noAutofit/>
+          </a:bodyPr>
+          <a:lstStyle/>
+          <a:p>
+            <a:pPr marL="0" marR="0" lvl="0" indent="0" algn="l" rtl="0">
+              <a:spcBef>
+                <a:spcPts val="0"/>
+              </a:spcBef>
+              <a:spcAft>
+                <a:spcPts val="0"/>
+              </a:spcAft>
+              <a:buNone/>
+            </a:pPr>
+            <a:endParaRPr sz="1800">
+              <a:solidFill>
+                <a:schemeClr val="dk1"/>
+              </a:solidFill>
+              <a:latin typeface="Calibri"/>
+              <a:ea typeface="Calibri"/>
+              <a:cs typeface="Calibri"/>
+              <a:sym typeface="Calibri"/>
+            </a:endParaRPr>
+          </a:p>
+        </p:txBody>
+      </p:sp>
+    </p:spTree>
+    <p:extLst>
+      <p:ext uri="{BB962C8B-B14F-4D97-AF65-F5344CB8AC3E}">
+        <p14:creationId xmlns:p14="http://schemas.microsoft.com/office/powerpoint/2010/main" val="285258353"/>
+      </p:ext>
+    </p:extLst>
+  </p:cSld>
+  <p:clrMapOvr>
+    <a:masterClrMapping/>
+  </p:clrMapOvr>
+  <p:timing>
+    <p:tnLst>
+      <p:par>
+        <p:cTn id="1" dur="indefinite" restart="never" nodeType="tmRoot"/>
+      </p:par>
+    </p:tnLst>
+  </p:timing>
+</p:sld>
+</file>
+
+<file path=ppt/slides/slide22.xml><?xml version="1.0" encoding="utf-8"?>
+<p:sld xmlns:a="http://schemas.openxmlformats.org/drawingml/2006/main" xmlns:r="http://schemas.openxmlformats.org/officeDocument/2006/relationships" xmlns:p="http://schemas.openxmlformats.org/presentationml/2006/main" showMasterSp="0">
+  <p:cSld>
+    <p:bg>
+      <p:bgPr>
+        <a:blipFill dpi="0" rotWithShape="1">
+          <a:blip r:embed="rId2">
+            <a:alphaModFix amt="0"/>
+            <a:duotone>
+              <a:schemeClr val="bg2">
+                <a:shade val="69000"/>
+                <a:hueMod val="108000"/>
+                <a:satMod val="164000"/>
+                <a:lumMod val="74000"/>
+              </a:schemeClr>
+              <a:schemeClr val="bg2">
+                <a:tint val="96000"/>
+                <a:hueMod val="88000"/>
+                <a:satMod val="140000"/>
+                <a:lumMod val="132000"/>
+              </a:schemeClr>
+            </a:duotone>
+            <a:lum/>
+          </a:blip>
+          <a:srcRect/>
+          <a:stretch>
+            <a:fillRect/>
+          </a:stretch>
+        </a:blipFill>
+        <a:effectLst/>
+      </p:bgPr>
+    </p:bg>
+    <p:spTree>
+      <p:nvGrpSpPr>
+        <p:cNvPr id="1" name=""/>
+        <p:cNvGrpSpPr/>
+        <p:nvPr/>
+      </p:nvGrpSpPr>
+      <p:grpSpPr>
+        <a:xfrm>
+          <a:off x="0" y="0"/>
+          <a:ext cx="0" cy="0"/>
+          <a:chOff x="0" y="0"/>
+          <a:chExt cx="0" cy="0"/>
+        </a:xfrm>
+      </p:grpSpPr>
+      <p:sp>
+        <p:nvSpPr>
+          <p:cNvPr id="4" name="CuadroTexto 3"/>
+          <p:cNvSpPr txBox="1"/>
+          <p:nvPr/>
+        </p:nvSpPr>
+        <p:spPr>
+          <a:xfrm>
+            <a:off x="1014413" y="785813"/>
+            <a:ext cx="1766830" cy="369332"/>
+          </a:xfrm>
+          <a:prstGeom prst="rect">
+            <a:avLst/>
+          </a:prstGeom>
+          <a:noFill/>
+        </p:spPr>
+        <p:txBody>
+          <a:bodyPr wrap="none" rtlCol="0">
+            <a:spAutoFit/>
+          </a:bodyPr>
+          <a:lstStyle/>
+          <a:p>
+            <a:r>
+              <a:rPr lang="es-ES" dirty="0" smtClean="0">
+                <a:solidFill>
+                  <a:schemeClr val="bg1"/>
+                </a:solidFill>
+              </a:rPr>
+              <a:t>Cronograma </a:t>
+            </a:r>
+            <a:endParaRPr lang="es-ES" dirty="0">
+              <a:solidFill>
+                <a:schemeClr val="bg1"/>
+              </a:solidFill>
+            </a:endParaRPr>
+          </a:p>
+        </p:txBody>
+      </p:sp>
+      <p:pic>
+        <p:nvPicPr>
+          <p:cNvPr id="6" name="Imagen 5"/>
+          <p:cNvPicPr/>
+          <p:nvPr/>
+        </p:nvPicPr>
+        <p:blipFill>
+          <a:blip r:embed="rId3">
+            <a:extLst>
+              <a:ext uri="{28A0092B-C50C-407E-A947-70E740481C1C}">
+                <a14:useLocalDpi xmlns:a14="http://schemas.microsoft.com/office/drawing/2010/main" val="0"/>
+              </a:ext>
+            </a:extLst>
+          </a:blip>
+          <a:stretch>
+            <a:fillRect/>
+          </a:stretch>
+        </p:blipFill>
+        <p:spPr>
+          <a:xfrm>
+            <a:off x="1213195" y="1642896"/>
+            <a:ext cx="9110248" cy="3883260"/>
+          </a:xfrm>
+          <a:prstGeom prst="rect">
+            <a:avLst/>
+          </a:prstGeom>
+        </p:spPr>
+      </p:pic>
+    </p:spTree>
+    <p:extLst>
+      <p:ext uri="{BB962C8B-B14F-4D97-AF65-F5344CB8AC3E}">
+        <p14:creationId xmlns:p14="http://schemas.microsoft.com/office/powerpoint/2010/main" val="1714289536"/>
+      </p:ext>
+    </p:extLst>
+  </p:cSld>
+  <p:clrMapOvr>
+    <a:masterClrMapping/>
+  </p:clrMapOvr>
+  <p:timing>
+    <p:tnLst>
+      <p:par>
+        <p:cTn id="1" dur="indefinite" restart="never" nodeType="tmRoot"/>
+      </p:par>
+    </p:tnLst>
+  </p:timing>
+</p:sld>
+</file>
+
+<file path=ppt/slides/slide23.xml><?xml version="1.0" encoding="utf-8"?>
+<p:sld xmlns:a="http://schemas.openxmlformats.org/drawingml/2006/main" xmlns:r="http://schemas.openxmlformats.org/officeDocument/2006/relationships" xmlns:p="http://schemas.openxmlformats.org/presentationml/2006/main">
+  <p:cSld>
+    <p:spTree>
+      <p:nvGrpSpPr>
+        <p:cNvPr id="1" name=""/>
+        <p:cNvGrpSpPr/>
+        <p:nvPr/>
+      </p:nvGrpSpPr>
+      <p:grpSpPr>
+        <a:xfrm>
+          <a:off x="0" y="0"/>
+          <a:ext cx="0" cy="0"/>
+          <a:chOff x="0" y="0"/>
+          <a:chExt cx="0" cy="0"/>
+        </a:xfrm>
+      </p:grpSpPr>
+      <p:sp>
+        <p:nvSpPr>
+          <p:cNvPr id="2" name="Título 1"/>
+          <p:cNvSpPr>
+            <a:spLocks noGrp="1"/>
+          </p:cNvSpPr>
+          <p:nvPr>
+            <p:ph type="title"/>
+          </p:nvPr>
+        </p:nvSpPr>
+        <p:spPr>
+          <a:xfrm>
+            <a:off x="646109" y="2338667"/>
+            <a:ext cx="4744037" cy="704571"/>
+          </a:xfrm>
+        </p:spPr>
+        <p:txBody>
+          <a:bodyPr/>
+          <a:lstStyle/>
+          <a:p>
+            <a:r>
+              <a:rPr lang="es-ES" dirty="0" smtClean="0"/>
+              <a:t>Estimaci</a:t>
+            </a:r>
+            <a:r>
+              <a:rPr lang="es-ES" dirty="0" smtClean="0"/>
+              <a:t>ón de costos</a:t>
+            </a:r>
+            <a:r>
+              <a:rPr lang="es-ES_tradnl" dirty="0"/>
+              <a:t/>
+            </a:r>
+            <a:br>
+              <a:rPr lang="es-ES_tradnl" dirty="0"/>
+            </a:br>
+            <a:endParaRPr lang="es-ES_tradnl" dirty="0"/>
+          </a:p>
+        </p:txBody>
+      </p:sp>
+      <p:pic>
+        <p:nvPicPr>
+          <p:cNvPr id="4" name="Imagen 3"/>
+          <p:cNvPicPr>
+            <a:picLocks noChangeAspect="1"/>
+          </p:cNvPicPr>
+          <p:nvPr/>
+        </p:nvPicPr>
+        <p:blipFill>
+          <a:blip r:embed="rId2">
+            <a:extLst>
+              <a:ext uri="{28A0092B-C50C-407E-A947-70E740481C1C}">
+                <a14:useLocalDpi xmlns:a14="http://schemas.microsoft.com/office/drawing/2010/main" val="0"/>
+              </a:ext>
+            </a:extLst>
+          </a:blip>
+          <a:stretch>
+            <a:fillRect/>
+          </a:stretch>
+        </p:blipFill>
+        <p:spPr>
+          <a:xfrm>
+            <a:off x="6982326" y="2454442"/>
+            <a:ext cx="3749842" cy="3749842"/>
+          </a:xfrm>
+          <a:prstGeom prst="rect">
+            <a:avLst/>
+          </a:prstGeom>
+        </p:spPr>
+      </p:pic>
+    </p:spTree>
+    <p:extLst>
+      <p:ext uri="{BB962C8B-B14F-4D97-AF65-F5344CB8AC3E}">
+        <p14:creationId xmlns:p14="http://schemas.microsoft.com/office/powerpoint/2010/main" val="756538839"/>
+      </p:ext>
+    </p:extLst>
+  </p:cSld>
+  <p:clrMapOvr>
+    <a:masterClrMapping/>
+  </p:clrMapOvr>
+  <p:timing>
+    <p:tnLst>
+      <p:par>
+        <p:cTn id="1" dur="indefinite" restart="never" nodeType="tmRoot"/>
+      </p:par>
+    </p:tnLst>
+  </p:timing>
+</p:sld>
+</file>
+
+<file path=ppt/slides/slide24.xml><?xml version="1.0" encoding="utf-8"?>
+<p:sld xmlns:a="http://schemas.openxmlformats.org/drawingml/2006/main" xmlns:r="http://schemas.openxmlformats.org/officeDocument/2006/relationships" xmlns:p="http://schemas.openxmlformats.org/presentationml/2006/main" showMasterSp="0">
+  <p:cSld>
+    <p:bg>
+      <p:bgPr>
+        <a:blipFill dpi="0" rotWithShape="1">
+          <a:blip r:embed="rId2">
+            <a:alphaModFix amt="0"/>
+            <a:duotone>
+              <a:schemeClr val="bg2">
+                <a:shade val="69000"/>
+                <a:hueMod val="108000"/>
+                <a:satMod val="164000"/>
+                <a:lumMod val="74000"/>
+              </a:schemeClr>
+              <a:schemeClr val="bg2">
+                <a:tint val="96000"/>
+                <a:hueMod val="88000"/>
+                <a:satMod val="140000"/>
+                <a:lumMod val="132000"/>
+              </a:schemeClr>
+            </a:duotone>
+            <a:lum/>
+          </a:blip>
+          <a:srcRect/>
+          <a:stretch>
+            <a:fillRect/>
+          </a:stretch>
+        </a:blipFill>
+        <a:effectLst/>
+      </p:bgPr>
+    </p:bg>
+    <p:spTree>
+      <p:nvGrpSpPr>
+        <p:cNvPr id="1" name=""/>
+        <p:cNvGrpSpPr/>
+        <p:nvPr/>
+      </p:nvGrpSpPr>
+      <p:grpSpPr>
+        <a:xfrm>
+          <a:off x="0" y="0"/>
+          <a:ext cx="0" cy="0"/>
+          <a:chOff x="0" y="0"/>
+          <a:chExt cx="0" cy="0"/>
+        </a:xfrm>
+      </p:grpSpPr>
+      <p:sp>
+        <p:nvSpPr>
+          <p:cNvPr id="4" name="CuadroTexto 3"/>
+          <p:cNvSpPr txBox="1"/>
+          <p:nvPr/>
+        </p:nvSpPr>
+        <p:spPr>
+          <a:xfrm>
+            <a:off x="1014413" y="785813"/>
+            <a:ext cx="2593980" cy="369332"/>
+          </a:xfrm>
+          <a:prstGeom prst="rect">
+            <a:avLst/>
+          </a:prstGeom>
+          <a:noFill/>
+        </p:spPr>
+        <p:txBody>
+          <a:bodyPr wrap="none" rtlCol="0">
+            <a:spAutoFit/>
+          </a:bodyPr>
+          <a:lstStyle/>
+          <a:p>
+            <a:r>
+              <a:rPr lang="es-ES" dirty="0" smtClean="0">
+                <a:solidFill>
+                  <a:schemeClr val="bg1"/>
+                </a:solidFill>
+              </a:rPr>
+              <a:t>Estimaci</a:t>
+            </a:r>
+            <a:r>
+              <a:rPr lang="es-ES" dirty="0" smtClean="0">
+                <a:solidFill>
+                  <a:schemeClr val="bg1"/>
+                </a:solidFill>
+              </a:rPr>
+              <a:t>ón de costos</a:t>
+            </a:r>
+            <a:endParaRPr lang="es-ES" dirty="0">
+              <a:solidFill>
+                <a:schemeClr val="bg1"/>
+              </a:solidFill>
+            </a:endParaRPr>
+          </a:p>
+        </p:txBody>
+      </p:sp>
+      <p:pic>
+        <p:nvPicPr>
+          <p:cNvPr id="3" name="Imagen 2"/>
+          <p:cNvPicPr>
+            <a:picLocks noChangeAspect="1"/>
+          </p:cNvPicPr>
+          <p:nvPr/>
+        </p:nvPicPr>
+        <p:blipFill>
+          <a:blip r:embed="rId3">
+            <a:extLst>
+              <a:ext uri="{28A0092B-C50C-407E-A947-70E740481C1C}">
+                <a14:useLocalDpi xmlns:a14="http://schemas.microsoft.com/office/drawing/2010/main" val="0"/>
+              </a:ext>
+            </a:extLst>
+          </a:blip>
+          <a:stretch>
+            <a:fillRect/>
+          </a:stretch>
+        </p:blipFill>
+        <p:spPr>
+          <a:xfrm>
+            <a:off x="5390322" y="1254139"/>
+            <a:ext cx="5383696" cy="5166539"/>
+          </a:xfrm>
+          <a:prstGeom prst="rect">
+            <a:avLst/>
+          </a:prstGeom>
+        </p:spPr>
+      </p:pic>
+      <p:pic>
+        <p:nvPicPr>
+          <p:cNvPr id="5" name="Imagen 4"/>
+          <p:cNvPicPr>
+            <a:picLocks noChangeAspect="1"/>
+          </p:cNvPicPr>
+          <p:nvPr/>
+        </p:nvPicPr>
+        <p:blipFill>
+          <a:blip r:embed="rId4">
+            <a:extLst>
+              <a:ext uri="{28A0092B-C50C-407E-A947-70E740481C1C}">
+                <a14:useLocalDpi xmlns:a14="http://schemas.microsoft.com/office/drawing/2010/main" val="0"/>
+              </a:ext>
+            </a:extLst>
+          </a:blip>
+          <a:stretch>
+            <a:fillRect/>
+          </a:stretch>
+        </p:blipFill>
+        <p:spPr>
+          <a:xfrm>
+            <a:off x="895145" y="2332382"/>
+            <a:ext cx="2448339" cy="2448339"/>
+          </a:xfrm>
+          <a:prstGeom prst="rect">
+            <a:avLst/>
+          </a:prstGeom>
+        </p:spPr>
+      </p:pic>
+      <p:graphicFrame>
+        <p:nvGraphicFramePr>
+          <p:cNvPr id="7" name="Diagrama 6"/>
+          <p:cNvGraphicFramePr/>
+          <p:nvPr>
+            <p:extLst>
+              <p:ext uri="{D42A27DB-BD31-4B8C-83A1-F6EECF244321}">
+                <p14:modId xmlns:p14="http://schemas.microsoft.com/office/powerpoint/2010/main" val="245830744"/>
+              </p:ext>
+            </p:extLst>
+          </p:nvPr>
+        </p:nvGraphicFramePr>
+        <p:xfrm>
+          <a:off x="3502991" y="2707493"/>
+          <a:ext cx="1903896" cy="1612715"/>
+        </p:xfrm>
+        <a:graphic>
+          <a:graphicData uri="http://schemas.openxmlformats.org/drawingml/2006/diagram">
+            <dgm:relIds xmlns:dgm="http://schemas.openxmlformats.org/drawingml/2006/diagram" xmlns:r="http://schemas.openxmlformats.org/officeDocument/2006/relationships" r:dm="rId5" r:lo="rId6" r:qs="rId7" r:cs="rId8"/>
+          </a:graphicData>
+        </a:graphic>
+      </p:graphicFrame>
+    </p:spTree>
+    <p:extLst>
+      <p:ext uri="{BB962C8B-B14F-4D97-AF65-F5344CB8AC3E}">
+        <p14:creationId xmlns:p14="http://schemas.microsoft.com/office/powerpoint/2010/main" val="538325114"/>
+      </p:ext>
+    </p:extLst>
+  </p:cSld>
+  <p:clrMapOvr>
+    <a:masterClrMapping/>
+  </p:clrMapOvr>
+  <p:timing>
+    <p:tnLst>
+      <p:par>
+        <p:cTn id="1" dur="indefinite" restart="never" nodeType="tmRoot"/>
+      </p:par>
+    </p:tnLst>
+  </p:timing>
+</p:sld>
+</file>
+
+<file path=ppt/slides/slide25.xml><?xml version="1.0" encoding="utf-8"?>
 <p:sld xmlns:a="http://schemas.openxmlformats.org/drawingml/2006/main" xmlns:r="http://schemas.openxmlformats.org/officeDocument/2006/relationships" xmlns:p="http://schemas.openxmlformats.org/presentationml/2006/main" showMasterSp="0">
   <p:cSld>
     <p:bg>

</xml_diff>